<commit_message>
many things; scan_ global variables to struct
</commit_message>
<xml_diff>
--- a/docs/drafts/figures/figure_1.pptx
+++ b/docs/drafts/figures/figure_1.pptx
@@ -289,7 +289,7 @@
             <a:fld id="{04282C63-7CD3-8445-AFE5-A60ABAB837C8}" type="datetimeFigureOut">
               <a:rPr lang="en-US" smtClean="0"/>
               <a:pPr/>
-              <a:t>9/8/14</a:t>
+              <a:t>9/9/14</a:t>
             </a:fld>
             <a:endParaRPr lang="en-US"/>
           </a:p>
@@ -456,7 +456,7 @@
             <a:fld id="{04282C63-7CD3-8445-AFE5-A60ABAB837C8}" type="datetimeFigureOut">
               <a:rPr lang="en-US" smtClean="0"/>
               <a:pPr/>
-              <a:t>9/8/14</a:t>
+              <a:t>9/9/14</a:t>
             </a:fld>
             <a:endParaRPr lang="en-US"/>
           </a:p>
@@ -633,7 +633,7 @@
             <a:fld id="{04282C63-7CD3-8445-AFE5-A60ABAB837C8}" type="datetimeFigureOut">
               <a:rPr lang="en-US" smtClean="0"/>
               <a:pPr/>
-              <a:t>9/8/14</a:t>
+              <a:t>9/9/14</a:t>
             </a:fld>
             <a:endParaRPr lang="en-US"/>
           </a:p>
@@ -800,7 +800,7 @@
             <a:fld id="{04282C63-7CD3-8445-AFE5-A60ABAB837C8}" type="datetimeFigureOut">
               <a:rPr lang="en-US" smtClean="0"/>
               <a:pPr/>
-              <a:t>9/8/14</a:t>
+              <a:t>9/9/14</a:t>
             </a:fld>
             <a:endParaRPr lang="en-US"/>
           </a:p>
@@ -1043,7 +1043,7 @@
             <a:fld id="{04282C63-7CD3-8445-AFE5-A60ABAB837C8}" type="datetimeFigureOut">
               <a:rPr lang="en-US" smtClean="0"/>
               <a:pPr/>
-              <a:t>9/8/14</a:t>
+              <a:t>9/9/14</a:t>
             </a:fld>
             <a:endParaRPr lang="en-US"/>
           </a:p>
@@ -1328,7 +1328,7 @@
             <a:fld id="{04282C63-7CD3-8445-AFE5-A60ABAB837C8}" type="datetimeFigureOut">
               <a:rPr lang="en-US" smtClean="0"/>
               <a:pPr/>
-              <a:t>9/8/14</a:t>
+              <a:t>9/9/14</a:t>
             </a:fld>
             <a:endParaRPr lang="en-US"/>
           </a:p>
@@ -1752,7 +1752,7 @@
             <a:fld id="{04282C63-7CD3-8445-AFE5-A60ABAB837C8}" type="datetimeFigureOut">
               <a:rPr lang="en-US" smtClean="0"/>
               <a:pPr/>
-              <a:t>9/8/14</a:t>
+              <a:t>9/9/14</a:t>
             </a:fld>
             <a:endParaRPr lang="en-US"/>
           </a:p>
@@ -1867,7 +1867,7 @@
             <a:fld id="{04282C63-7CD3-8445-AFE5-A60ABAB837C8}" type="datetimeFigureOut">
               <a:rPr lang="en-US" smtClean="0"/>
               <a:pPr/>
-              <a:t>9/8/14</a:t>
+              <a:t>9/9/14</a:t>
             </a:fld>
             <a:endParaRPr lang="en-US"/>
           </a:p>
@@ -1959,7 +1959,7 @@
             <a:fld id="{04282C63-7CD3-8445-AFE5-A60ABAB837C8}" type="datetimeFigureOut">
               <a:rPr lang="en-US" smtClean="0"/>
               <a:pPr/>
-              <a:t>9/8/14</a:t>
+              <a:t>9/9/14</a:t>
             </a:fld>
             <a:endParaRPr lang="en-US"/>
           </a:p>
@@ -2233,7 +2233,7 @@
             <a:fld id="{04282C63-7CD3-8445-AFE5-A60ABAB837C8}" type="datetimeFigureOut">
               <a:rPr lang="en-US" smtClean="0"/>
               <a:pPr/>
-              <a:t>9/8/14</a:t>
+              <a:t>9/9/14</a:t>
             </a:fld>
             <a:endParaRPr lang="en-US"/>
           </a:p>
@@ -2483,7 +2483,7 @@
             <a:fld id="{04282C63-7CD3-8445-AFE5-A60ABAB837C8}" type="datetimeFigureOut">
               <a:rPr lang="en-US" smtClean="0"/>
               <a:pPr/>
-              <a:t>9/8/14</a:t>
+              <a:t>9/9/14</a:t>
             </a:fld>
             <a:endParaRPr lang="en-US"/>
           </a:p>
@@ -2693,7 +2693,7 @@
             <a:fld id="{04282C63-7CD3-8445-AFE5-A60ABAB837C8}" type="datetimeFigureOut">
               <a:rPr lang="en-US" smtClean="0"/>
               <a:pPr/>
-              <a:t>9/8/14</a:t>
+              <a:t>9/9/14</a:t>
             </a:fld>
             <a:endParaRPr lang="en-US"/>
           </a:p>
@@ -3066,16 +3066,1572 @@
       </p:grpSpPr>
       <p:grpSp>
         <p:nvGrpSpPr>
-          <p:cNvPr id="4" name="Group 3"/>
+          <p:cNvPr id="87" name="Group 86"/>
           <p:cNvGrpSpPr/>
           <p:nvPr/>
         </p:nvGrpSpPr>
         <p:grpSpPr>
           <a:xfrm>
-            <a:off x="2056453" y="1747285"/>
-            <a:ext cx="6914309" cy="3960365"/>
-            <a:chOff x="9211239" y="6179810"/>
-            <a:chExt cx="8339973" cy="4776956"/>
+            <a:off x="946713" y="2782466"/>
+            <a:ext cx="8977557" cy="6981378"/>
+            <a:chOff x="2139596" y="3161297"/>
+            <a:chExt cx="7340270" cy="5708144"/>
+          </a:xfrm>
+        </p:grpSpPr>
+        <p:pic>
+          <p:nvPicPr>
+            <p:cNvPr id="28" name="Content Placeholder 39" descr="6_rt.pdf"/>
+            <p:cNvPicPr>
+              <a:picLocks noChangeAspect="1"/>
+            </p:cNvPicPr>
+            <p:nvPr/>
+          </p:nvPicPr>
+          <mc:AlternateContent>
+            <mc:Choice xmlns:ma="http://schemas.microsoft.com/office/mac/drawingml/2008/main" Requires="ma">
+              <p:blipFill>
+                <a:blip r:embed="rId2"/>
+                <a:stretch>
+                  <a:fillRect/>
+                </a:stretch>
+              </p:blipFill>
+            </mc:Choice>
+            <mc:Fallback>
+              <p:blipFill>
+                <a:blip r:embed="rId3"/>
+                <a:stretch>
+                  <a:fillRect/>
+                </a:stretch>
+              </p:blipFill>
+            </mc:Fallback>
+          </mc:AlternateContent>
+          <p:spPr>
+            <a:xfrm>
+              <a:off x="2206411" y="3161297"/>
+              <a:ext cx="7273455" cy="5442103"/>
+            </a:xfrm>
+            <a:prstGeom prst="rect">
+              <a:avLst/>
+            </a:prstGeom>
+            <a:noFill/>
+            <a:ln>
+              <a:noFill/>
+            </a:ln>
+          </p:spPr>
+        </p:pic>
+        <p:grpSp>
+          <p:nvGrpSpPr>
+            <p:cNvPr id="64" name="Group 63"/>
+            <p:cNvGrpSpPr/>
+            <p:nvPr/>
+          </p:nvGrpSpPr>
+          <p:grpSpPr>
+            <a:xfrm>
+              <a:off x="3652986" y="7012389"/>
+              <a:ext cx="1011110" cy="931321"/>
+              <a:chOff x="3474412" y="6277886"/>
+              <a:chExt cx="840292" cy="773984"/>
+            </a:xfrm>
+          </p:grpSpPr>
+          <p:grpSp>
+            <p:nvGrpSpPr>
+              <p:cNvPr id="35" name="Group 34"/>
+              <p:cNvGrpSpPr/>
+              <p:nvPr/>
+            </p:nvGrpSpPr>
+            <p:grpSpPr>
+              <a:xfrm>
+                <a:off x="3613588" y="6277886"/>
+                <a:ext cx="564854" cy="564850"/>
+                <a:chOff x="3246958" y="4775206"/>
+                <a:chExt cx="461665" cy="461665"/>
+              </a:xfrm>
+            </p:grpSpPr>
+            <p:sp>
+              <p:nvSpPr>
+                <p:cNvPr id="36" name="Rounded Rectangle 35"/>
+                <p:cNvSpPr/>
+                <p:nvPr/>
+              </p:nvSpPr>
+              <p:spPr>
+                <a:xfrm>
+                  <a:off x="3246958" y="4775206"/>
+                  <a:ext cx="461665" cy="461665"/>
+                </a:xfrm>
+                <a:prstGeom prst="roundRect">
+                  <a:avLst/>
+                </a:prstGeom>
+                <a:ln>
+                  <a:solidFill>
+                    <a:schemeClr val="tx1"/>
+                  </a:solidFill>
+                </a:ln>
+              </p:spPr>
+              <p:style>
+                <a:lnRef idx="2">
+                  <a:schemeClr val="accent1"/>
+                </a:lnRef>
+                <a:fillRef idx="1">
+                  <a:schemeClr val="lt1"/>
+                </a:fillRef>
+                <a:effectRef idx="0">
+                  <a:schemeClr val="accent1"/>
+                </a:effectRef>
+                <a:fontRef idx="minor">
+                  <a:schemeClr val="dk1"/>
+                </a:fontRef>
+              </p:style>
+              <p:txBody>
+                <a:bodyPr rtlCol="0" anchor="ctr"/>
+                <a:lstStyle/>
+                <a:p>
+                  <a:pPr algn="ctr"/>
+                  <a:endParaRPr lang="en-US"/>
+                </a:p>
+              </p:txBody>
+            </p:sp>
+            <p:sp>
+              <p:nvSpPr>
+                <p:cNvPr id="37" name="Right Arrow 36"/>
+                <p:cNvSpPr/>
+                <p:nvPr/>
+              </p:nvSpPr>
+              <p:spPr>
+                <a:xfrm>
+                  <a:off x="3327988" y="4954970"/>
+                  <a:ext cx="148612" cy="112692"/>
+                </a:xfrm>
+                <a:prstGeom prst="rightArrow">
+                  <a:avLst/>
+                </a:prstGeom>
+                <a:solidFill>
+                  <a:srgbClr val="F5BF64"/>
+                </a:solidFill>
+                <a:ln>
+                  <a:solidFill>
+                    <a:schemeClr val="tx1"/>
+                  </a:solidFill>
+                </a:ln>
+                <a:effectLst/>
+              </p:spPr>
+              <p:style>
+                <a:lnRef idx="1">
+                  <a:schemeClr val="accent1"/>
+                </a:lnRef>
+                <a:fillRef idx="3">
+                  <a:schemeClr val="accent1"/>
+                </a:fillRef>
+                <a:effectRef idx="2">
+                  <a:schemeClr val="accent1"/>
+                </a:effectRef>
+                <a:fontRef idx="minor">
+                  <a:schemeClr val="lt1"/>
+                </a:fontRef>
+              </p:style>
+              <p:txBody>
+                <a:bodyPr rtlCol="0" anchor="ctr"/>
+                <a:lstStyle/>
+                <a:p>
+                  <a:pPr algn="ctr"/>
+                  <a:endParaRPr lang="en-US"/>
+                </a:p>
+              </p:txBody>
+            </p:sp>
+            <p:sp>
+              <p:nvSpPr>
+                <p:cNvPr id="38" name="Right Arrow 37"/>
+                <p:cNvSpPr/>
+                <p:nvPr/>
+              </p:nvSpPr>
+              <p:spPr>
+                <a:xfrm>
+                  <a:off x="3495666" y="4954970"/>
+                  <a:ext cx="148612" cy="112692"/>
+                </a:xfrm>
+                <a:prstGeom prst="rightArrow">
+                  <a:avLst/>
+                </a:prstGeom>
+                <a:solidFill>
+                  <a:srgbClr val="F5BF64"/>
+                </a:solidFill>
+                <a:ln>
+                  <a:solidFill>
+                    <a:schemeClr val="tx1"/>
+                  </a:solidFill>
+                </a:ln>
+                <a:effectLst/>
+              </p:spPr>
+              <p:style>
+                <a:lnRef idx="1">
+                  <a:schemeClr val="accent1"/>
+                </a:lnRef>
+                <a:fillRef idx="3">
+                  <a:schemeClr val="accent1"/>
+                </a:fillRef>
+                <a:effectRef idx="2">
+                  <a:schemeClr val="accent1"/>
+                </a:effectRef>
+                <a:fontRef idx="minor">
+                  <a:schemeClr val="lt1"/>
+                </a:fontRef>
+              </p:style>
+              <p:txBody>
+                <a:bodyPr rtlCol="0" anchor="ctr"/>
+                <a:lstStyle/>
+                <a:p>
+                  <a:pPr algn="ctr"/>
+                  <a:endParaRPr lang="en-US"/>
+                </a:p>
+              </p:txBody>
+            </p:sp>
+          </p:grpSp>
+          <p:sp>
+            <p:nvSpPr>
+              <p:cNvPr id="53" name="TextBox 52"/>
+              <p:cNvSpPr txBox="1"/>
+              <p:nvPr/>
+            </p:nvSpPr>
+            <p:spPr>
+              <a:xfrm>
+                <a:off x="3474412" y="6842737"/>
+                <a:ext cx="840292" cy="209133"/>
+              </a:xfrm>
+              <a:prstGeom prst="rect">
+                <a:avLst/>
+              </a:prstGeom>
+              <a:noFill/>
+            </p:spPr>
+            <p:txBody>
+              <a:bodyPr wrap="square" rtlCol="0">
+                <a:spAutoFit/>
+              </a:bodyPr>
+              <a:lstStyle/>
+              <a:p>
+                <a:pPr algn="ctr"/>
+                <a:r>
+                  <a:rPr lang="en-US" sz="1400" dirty="0" smtClean="0"/>
+                  <a:t>Regular</a:t>
+                </a:r>
+              </a:p>
+            </p:txBody>
+          </p:sp>
+        </p:grpSp>
+        <p:grpSp>
+          <p:nvGrpSpPr>
+            <p:cNvPr id="66" name="Group 65"/>
+            <p:cNvGrpSpPr/>
+            <p:nvPr/>
+          </p:nvGrpSpPr>
+          <p:grpSpPr>
+            <a:xfrm>
+              <a:off x="6524278" y="7012389"/>
+              <a:ext cx="899756" cy="931321"/>
+              <a:chOff x="5860624" y="6277886"/>
+              <a:chExt cx="747750" cy="773984"/>
+            </a:xfrm>
+          </p:grpSpPr>
+          <p:grpSp>
+            <p:nvGrpSpPr>
+              <p:cNvPr id="31" name="Group 30"/>
+              <p:cNvGrpSpPr/>
+              <p:nvPr/>
+            </p:nvGrpSpPr>
+            <p:grpSpPr>
+              <a:xfrm>
+                <a:off x="5953529" y="6277886"/>
+                <a:ext cx="564854" cy="564850"/>
+                <a:chOff x="5108682" y="4740989"/>
+                <a:chExt cx="461665" cy="461665"/>
+              </a:xfrm>
+            </p:grpSpPr>
+            <p:sp>
+              <p:nvSpPr>
+                <p:cNvPr id="32" name="Rounded Rectangle 31"/>
+                <p:cNvSpPr/>
+                <p:nvPr/>
+              </p:nvSpPr>
+              <p:spPr>
+                <a:xfrm>
+                  <a:off x="5108682" y="4740989"/>
+                  <a:ext cx="461665" cy="461665"/>
+                </a:xfrm>
+                <a:prstGeom prst="roundRect">
+                  <a:avLst/>
+                </a:prstGeom>
+                <a:ln>
+                  <a:solidFill>
+                    <a:schemeClr val="tx1"/>
+                  </a:solidFill>
+                </a:ln>
+              </p:spPr>
+              <p:style>
+                <a:lnRef idx="2">
+                  <a:schemeClr val="accent1"/>
+                </a:lnRef>
+                <a:fillRef idx="1">
+                  <a:schemeClr val="lt1"/>
+                </a:fillRef>
+                <a:effectRef idx="0">
+                  <a:schemeClr val="accent1"/>
+                </a:effectRef>
+                <a:fontRef idx="minor">
+                  <a:schemeClr val="dk1"/>
+                </a:fontRef>
+              </p:style>
+              <p:txBody>
+                <a:bodyPr rtlCol="0" anchor="ctr"/>
+                <a:lstStyle/>
+                <a:p>
+                  <a:pPr algn="ctr"/>
+                  <a:endParaRPr lang="en-US"/>
+                </a:p>
+              </p:txBody>
+            </p:sp>
+            <p:sp>
+              <p:nvSpPr>
+                <p:cNvPr id="33" name="Right Arrow 32"/>
+                <p:cNvSpPr/>
+                <p:nvPr/>
+              </p:nvSpPr>
+              <p:spPr>
+                <a:xfrm>
+                  <a:off x="5189712" y="4920753"/>
+                  <a:ext cx="148612" cy="112692"/>
+                </a:xfrm>
+                <a:prstGeom prst="rightArrow">
+                  <a:avLst/>
+                </a:prstGeom>
+                <a:solidFill>
+                  <a:srgbClr val="F5BF64"/>
+                </a:solidFill>
+                <a:ln>
+                  <a:solidFill>
+                    <a:schemeClr val="tx1"/>
+                  </a:solidFill>
+                </a:ln>
+                <a:effectLst/>
+              </p:spPr>
+              <p:style>
+                <a:lnRef idx="1">
+                  <a:schemeClr val="accent1"/>
+                </a:lnRef>
+                <a:fillRef idx="3">
+                  <a:schemeClr val="accent1"/>
+                </a:fillRef>
+                <a:effectRef idx="2">
+                  <a:schemeClr val="accent1"/>
+                </a:effectRef>
+                <a:fontRef idx="minor">
+                  <a:schemeClr val="lt1"/>
+                </a:fontRef>
+              </p:style>
+              <p:txBody>
+                <a:bodyPr rtlCol="0" anchor="ctr"/>
+                <a:lstStyle/>
+                <a:p>
+                  <a:pPr algn="ctr"/>
+                  <a:endParaRPr lang="en-US"/>
+                </a:p>
+              </p:txBody>
+            </p:sp>
+            <p:sp>
+              <p:nvSpPr>
+                <p:cNvPr id="34" name="Right Arrow 33"/>
+                <p:cNvSpPr/>
+                <p:nvPr/>
+              </p:nvSpPr>
+              <p:spPr>
+                <a:xfrm rot="16200000">
+                  <a:off x="5264018" y="4793166"/>
+                  <a:ext cx="148612" cy="112692"/>
+                </a:xfrm>
+                <a:prstGeom prst="rightArrow">
+                  <a:avLst/>
+                </a:prstGeom>
+                <a:solidFill>
+                  <a:srgbClr val="F5BF64"/>
+                </a:solidFill>
+                <a:ln>
+                  <a:solidFill>
+                    <a:schemeClr val="tx1"/>
+                  </a:solidFill>
+                </a:ln>
+                <a:effectLst/>
+              </p:spPr>
+              <p:style>
+                <a:lnRef idx="1">
+                  <a:schemeClr val="accent1"/>
+                </a:lnRef>
+                <a:fillRef idx="3">
+                  <a:schemeClr val="accent1"/>
+                </a:fillRef>
+                <a:effectRef idx="2">
+                  <a:schemeClr val="accent1"/>
+                </a:effectRef>
+                <a:fontRef idx="minor">
+                  <a:schemeClr val="lt1"/>
+                </a:fontRef>
+              </p:style>
+              <p:txBody>
+                <a:bodyPr rtlCol="0" anchor="ctr"/>
+                <a:lstStyle/>
+                <a:p>
+                  <a:pPr algn="ctr"/>
+                  <a:endParaRPr lang="en-US"/>
+                </a:p>
+              </p:txBody>
+            </p:sp>
+          </p:grpSp>
+          <p:sp>
+            <p:nvSpPr>
+              <p:cNvPr id="54" name="TextBox 53"/>
+              <p:cNvSpPr txBox="1"/>
+              <p:nvPr/>
+            </p:nvSpPr>
+            <p:spPr>
+              <a:xfrm>
+                <a:off x="5860624" y="6842737"/>
+                <a:ext cx="747750" cy="209133"/>
+              </a:xfrm>
+              <a:prstGeom prst="rect">
+                <a:avLst/>
+              </a:prstGeom>
+              <a:noFill/>
+            </p:spPr>
+            <p:txBody>
+              <a:bodyPr wrap="square" rtlCol="0">
+                <a:spAutoFit/>
+              </a:bodyPr>
+              <a:lstStyle/>
+              <a:p>
+                <a:pPr algn="ctr"/>
+                <a:r>
+                  <a:rPr lang="en-US" sz="1400" dirty="0" smtClean="0"/>
+                  <a:t>Elbow</a:t>
+                </a:r>
+                <a:endParaRPr lang="en-US" sz="1400" dirty="0"/>
+              </a:p>
+            </p:txBody>
+          </p:sp>
+        </p:grpSp>
+        <p:grpSp>
+          <p:nvGrpSpPr>
+            <p:cNvPr id="67" name="Group 66"/>
+            <p:cNvGrpSpPr/>
+            <p:nvPr/>
+          </p:nvGrpSpPr>
+          <p:grpSpPr>
+            <a:xfrm>
+              <a:off x="7195990" y="7012389"/>
+              <a:ext cx="1169574" cy="931321"/>
+              <a:chOff x="6418856" y="6277886"/>
+              <a:chExt cx="971985" cy="773984"/>
+            </a:xfrm>
+          </p:grpSpPr>
+          <p:grpSp>
+            <p:nvGrpSpPr>
+              <p:cNvPr id="45" name="Group 44"/>
+              <p:cNvGrpSpPr/>
+              <p:nvPr/>
+            </p:nvGrpSpPr>
+            <p:grpSpPr>
+              <a:xfrm>
+                <a:off x="6627932" y="6277886"/>
+                <a:ext cx="556704" cy="564850"/>
+                <a:chOff x="5628294" y="3578843"/>
+                <a:chExt cx="1617056" cy="1640718"/>
+              </a:xfrm>
+            </p:grpSpPr>
+            <p:sp>
+              <p:nvSpPr>
+                <p:cNvPr id="46" name="Rounded Rectangle 45"/>
+                <p:cNvSpPr/>
+                <p:nvPr/>
+              </p:nvSpPr>
+              <p:spPr>
+                <a:xfrm>
+                  <a:off x="5628294" y="3578843"/>
+                  <a:ext cx="1617056" cy="1640718"/>
+                </a:xfrm>
+                <a:prstGeom prst="roundRect">
+                  <a:avLst/>
+                </a:prstGeom>
+                <a:ln>
+                  <a:solidFill>
+                    <a:schemeClr val="tx1"/>
+                  </a:solidFill>
+                </a:ln>
+              </p:spPr>
+              <p:style>
+                <a:lnRef idx="2">
+                  <a:schemeClr val="accent1"/>
+                </a:lnRef>
+                <a:fillRef idx="1">
+                  <a:schemeClr val="lt1"/>
+                </a:fillRef>
+                <a:effectRef idx="0">
+                  <a:schemeClr val="accent1"/>
+                </a:effectRef>
+                <a:fontRef idx="minor">
+                  <a:schemeClr val="dk1"/>
+                </a:fontRef>
+              </p:style>
+              <p:txBody>
+                <a:bodyPr rtlCol="0" anchor="ctr"/>
+                <a:lstStyle/>
+                <a:p>
+                  <a:pPr algn="ctr"/>
+                  <a:endParaRPr lang="en-US"/>
+                </a:p>
+              </p:txBody>
+            </p:sp>
+            <p:sp>
+              <p:nvSpPr>
+                <p:cNvPr id="47" name="Right Arrow 46"/>
+                <p:cNvSpPr/>
+                <p:nvPr/>
+              </p:nvSpPr>
+              <p:spPr>
+                <a:xfrm>
+                  <a:off x="5912117" y="4208498"/>
+                  <a:ext cx="520537" cy="394722"/>
+                </a:xfrm>
+                <a:prstGeom prst="rightArrow">
+                  <a:avLst/>
+                </a:prstGeom>
+                <a:solidFill>
+                  <a:srgbClr val="F5BF64"/>
+                </a:solidFill>
+                <a:ln>
+                  <a:solidFill>
+                    <a:schemeClr val="tx1"/>
+                  </a:solidFill>
+                </a:ln>
+                <a:effectLst/>
+              </p:spPr>
+              <p:style>
+                <a:lnRef idx="1">
+                  <a:schemeClr val="accent1"/>
+                </a:lnRef>
+                <a:fillRef idx="3">
+                  <a:schemeClr val="accent1"/>
+                </a:fillRef>
+                <a:effectRef idx="2">
+                  <a:schemeClr val="accent1"/>
+                </a:effectRef>
+                <a:fontRef idx="minor">
+                  <a:schemeClr val="lt1"/>
+                </a:fontRef>
+              </p:style>
+              <p:txBody>
+                <a:bodyPr rtlCol="0" anchor="ctr"/>
+                <a:lstStyle/>
+                <a:p>
+                  <a:pPr algn="ctr"/>
+                  <a:endParaRPr lang="en-US"/>
+                </a:p>
+              </p:txBody>
+            </p:sp>
+            <p:sp>
+              <p:nvSpPr>
+                <p:cNvPr id="48" name="Right Arrow 47"/>
+                <p:cNvSpPr/>
+                <p:nvPr/>
+              </p:nvSpPr>
+              <p:spPr>
+                <a:xfrm rot="16200000">
+                  <a:off x="6185355" y="3775019"/>
+                  <a:ext cx="520537" cy="394722"/>
+                </a:xfrm>
+                <a:prstGeom prst="rightArrow">
+                  <a:avLst/>
+                </a:prstGeom>
+                <a:solidFill>
+                  <a:srgbClr val="578FD3"/>
+                </a:solidFill>
+                <a:ln>
+                  <a:solidFill>
+                    <a:schemeClr val="tx1"/>
+                  </a:solidFill>
+                </a:ln>
+                <a:effectLst/>
+              </p:spPr>
+              <p:style>
+                <a:lnRef idx="1">
+                  <a:schemeClr val="accent1"/>
+                </a:lnRef>
+                <a:fillRef idx="3">
+                  <a:schemeClr val="accent1"/>
+                </a:fillRef>
+                <a:effectRef idx="2">
+                  <a:schemeClr val="accent1"/>
+                </a:effectRef>
+                <a:fontRef idx="minor">
+                  <a:schemeClr val="lt1"/>
+                </a:fontRef>
+              </p:style>
+              <p:txBody>
+                <a:bodyPr rtlCol="0" anchor="ctr"/>
+                <a:lstStyle/>
+                <a:p>
+                  <a:pPr algn="ctr"/>
+                  <a:endParaRPr lang="en-US"/>
+                </a:p>
+              </p:txBody>
+            </p:sp>
+            <p:sp>
+              <p:nvSpPr>
+                <p:cNvPr id="49" name="Rectangle 48"/>
+                <p:cNvSpPr/>
+                <p:nvPr/>
+              </p:nvSpPr>
+              <p:spPr>
+                <a:xfrm>
+                  <a:off x="6584618" y="4301776"/>
+                  <a:ext cx="403558" cy="198458"/>
+                </a:xfrm>
+                <a:prstGeom prst="rect">
+                  <a:avLst/>
+                </a:prstGeom>
+                <a:solidFill>
+                  <a:srgbClr val="F5BF64"/>
+                </a:solidFill>
+                <a:ln>
+                  <a:solidFill>
+                    <a:schemeClr val="tx1"/>
+                  </a:solidFill>
+                </a:ln>
+                <a:effectLst/>
+              </p:spPr>
+              <p:style>
+                <a:lnRef idx="1">
+                  <a:schemeClr val="accent1"/>
+                </a:lnRef>
+                <a:fillRef idx="3">
+                  <a:schemeClr val="accent1"/>
+                </a:fillRef>
+                <a:effectRef idx="2">
+                  <a:schemeClr val="accent1"/>
+                </a:effectRef>
+                <a:fontRef idx="minor">
+                  <a:schemeClr val="lt1"/>
+                </a:fontRef>
+              </p:style>
+              <p:txBody>
+                <a:bodyPr rtlCol="0" anchor="ctr"/>
+                <a:lstStyle/>
+                <a:p>
+                  <a:pPr algn="ctr"/>
+                  <a:endParaRPr lang="en-US"/>
+                </a:p>
+              </p:txBody>
+            </p:sp>
+            <p:sp>
+              <p:nvSpPr>
+                <p:cNvPr id="50" name="Rectangle 49"/>
+                <p:cNvSpPr/>
+                <p:nvPr/>
+              </p:nvSpPr>
+              <p:spPr>
+                <a:xfrm rot="5400000">
+                  <a:off x="6172384" y="4739748"/>
+                  <a:ext cx="520537" cy="198458"/>
+                </a:xfrm>
+                <a:prstGeom prst="rect">
+                  <a:avLst/>
+                </a:prstGeom>
+                <a:solidFill>
+                  <a:srgbClr val="578FD3"/>
+                </a:solidFill>
+                <a:ln>
+                  <a:solidFill>
+                    <a:schemeClr val="tx1"/>
+                  </a:solidFill>
+                </a:ln>
+                <a:effectLst/>
+              </p:spPr>
+              <p:style>
+                <a:lnRef idx="1">
+                  <a:schemeClr val="accent1"/>
+                </a:lnRef>
+                <a:fillRef idx="3">
+                  <a:schemeClr val="accent1"/>
+                </a:fillRef>
+                <a:effectRef idx="2">
+                  <a:schemeClr val="accent1"/>
+                </a:effectRef>
+                <a:fontRef idx="minor">
+                  <a:schemeClr val="lt1"/>
+                </a:fontRef>
+              </p:style>
+              <p:txBody>
+                <a:bodyPr rtlCol="0" anchor="ctr"/>
+                <a:lstStyle/>
+                <a:p>
+                  <a:pPr algn="ctr"/>
+                  <a:endParaRPr lang="en-US"/>
+                </a:p>
+              </p:txBody>
+            </p:sp>
+          </p:grpSp>
+          <p:sp>
+            <p:nvSpPr>
+              <p:cNvPr id="55" name="TextBox 54"/>
+              <p:cNvSpPr txBox="1"/>
+              <p:nvPr/>
+            </p:nvSpPr>
+            <p:spPr>
+              <a:xfrm>
+                <a:off x="6418856" y="6842737"/>
+                <a:ext cx="971985" cy="209133"/>
+              </a:xfrm>
+              <a:prstGeom prst="rect">
+                <a:avLst/>
+              </a:prstGeom>
+              <a:noFill/>
+            </p:spPr>
+            <p:txBody>
+              <a:bodyPr wrap="square" rtlCol="0">
+                <a:spAutoFit/>
+              </a:bodyPr>
+              <a:lstStyle/>
+              <a:p>
+                <a:pPr algn="ctr"/>
+                <a:r>
+                  <a:rPr lang="en-US" sz="1400" dirty="0" smtClean="0"/>
+                  <a:t>Exchange</a:t>
+                </a:r>
+                <a:endParaRPr lang="en-US" sz="1400" dirty="0"/>
+              </a:p>
+            </p:txBody>
+          </p:sp>
+        </p:grpSp>
+        <p:grpSp>
+          <p:nvGrpSpPr>
+            <p:cNvPr id="65" name="Group 64"/>
+            <p:cNvGrpSpPr/>
+            <p:nvPr/>
+          </p:nvGrpSpPr>
+          <p:grpSpPr>
+            <a:xfrm>
+              <a:off x="4376470" y="7012389"/>
+              <a:ext cx="1169574" cy="931321"/>
+              <a:chOff x="4075669" y="6277886"/>
+              <a:chExt cx="971985" cy="773984"/>
+            </a:xfrm>
+          </p:grpSpPr>
+          <p:grpSp>
+            <p:nvGrpSpPr>
+              <p:cNvPr id="39" name="Group 38"/>
+              <p:cNvGrpSpPr/>
+              <p:nvPr/>
+            </p:nvGrpSpPr>
+            <p:grpSpPr>
+              <a:xfrm>
+                <a:off x="4284804" y="6277886"/>
+                <a:ext cx="556586" cy="556582"/>
+                <a:chOff x="3766570" y="4775206"/>
+                <a:chExt cx="454909" cy="454909"/>
+              </a:xfrm>
+            </p:grpSpPr>
+            <p:sp>
+              <p:nvSpPr>
+                <p:cNvPr id="40" name="Rounded Rectangle 39"/>
+                <p:cNvSpPr/>
+                <p:nvPr/>
+              </p:nvSpPr>
+              <p:spPr>
+                <a:xfrm>
+                  <a:off x="3766570" y="4775206"/>
+                  <a:ext cx="454909" cy="454909"/>
+                </a:xfrm>
+                <a:prstGeom prst="roundRect">
+                  <a:avLst/>
+                </a:prstGeom>
+                <a:ln>
+                  <a:solidFill>
+                    <a:schemeClr val="tx1"/>
+                  </a:solidFill>
+                </a:ln>
+              </p:spPr>
+              <p:style>
+                <a:lnRef idx="2">
+                  <a:schemeClr val="accent1"/>
+                </a:lnRef>
+                <a:fillRef idx="1">
+                  <a:schemeClr val="lt1"/>
+                </a:fillRef>
+                <a:effectRef idx="0">
+                  <a:schemeClr val="accent1"/>
+                </a:effectRef>
+                <a:fontRef idx="minor">
+                  <a:schemeClr val="dk1"/>
+                </a:fontRef>
+              </p:style>
+              <p:txBody>
+                <a:bodyPr rtlCol="0" anchor="ctr"/>
+                <a:lstStyle/>
+                <a:p>
+                  <a:pPr algn="ctr"/>
+                  <a:endParaRPr lang="en-US"/>
+                </a:p>
+              </p:txBody>
+            </p:sp>
+            <p:sp>
+              <p:nvSpPr>
+                <p:cNvPr id="41" name="Right Arrow 40"/>
+                <p:cNvSpPr/>
+                <p:nvPr/>
+              </p:nvSpPr>
+              <p:spPr>
+                <a:xfrm>
+                  <a:off x="3846415" y="4952340"/>
+                  <a:ext cx="146437" cy="111043"/>
+                </a:xfrm>
+                <a:prstGeom prst="rightArrow">
+                  <a:avLst/>
+                </a:prstGeom>
+                <a:solidFill>
+                  <a:srgbClr val="F5BF64"/>
+                </a:solidFill>
+                <a:ln>
+                  <a:solidFill>
+                    <a:schemeClr val="tx1"/>
+                  </a:solidFill>
+                </a:ln>
+                <a:effectLst/>
+              </p:spPr>
+              <p:style>
+                <a:lnRef idx="1">
+                  <a:schemeClr val="accent1"/>
+                </a:lnRef>
+                <a:fillRef idx="3">
+                  <a:schemeClr val="accent1"/>
+                </a:fillRef>
+                <a:effectRef idx="2">
+                  <a:schemeClr val="accent1"/>
+                </a:effectRef>
+                <a:fontRef idx="minor">
+                  <a:schemeClr val="lt1"/>
+                </a:fontRef>
+              </p:style>
+              <p:txBody>
+                <a:bodyPr rtlCol="0" anchor="ctr"/>
+                <a:lstStyle/>
+                <a:p>
+                  <a:pPr algn="ctr"/>
+                  <a:endParaRPr lang="en-US"/>
+                </a:p>
+              </p:txBody>
+            </p:sp>
+            <p:sp>
+              <p:nvSpPr>
+                <p:cNvPr id="42" name="Right Arrow 41"/>
+                <p:cNvSpPr/>
+                <p:nvPr/>
+              </p:nvSpPr>
+              <p:spPr>
+                <a:xfrm>
+                  <a:off x="4011639" y="4952340"/>
+                  <a:ext cx="146437" cy="111043"/>
+                </a:xfrm>
+                <a:prstGeom prst="rightArrow">
+                  <a:avLst/>
+                </a:prstGeom>
+                <a:solidFill>
+                  <a:srgbClr val="F5BF64"/>
+                </a:solidFill>
+                <a:ln>
+                  <a:solidFill>
+                    <a:schemeClr val="tx1"/>
+                  </a:solidFill>
+                </a:ln>
+                <a:effectLst/>
+              </p:spPr>
+              <p:style>
+                <a:lnRef idx="1">
+                  <a:schemeClr val="accent1"/>
+                </a:lnRef>
+                <a:fillRef idx="3">
+                  <a:schemeClr val="accent1"/>
+                </a:fillRef>
+                <a:effectRef idx="2">
+                  <a:schemeClr val="accent1"/>
+                </a:effectRef>
+                <a:fontRef idx="minor">
+                  <a:schemeClr val="lt1"/>
+                </a:fontRef>
+              </p:style>
+              <p:txBody>
+                <a:bodyPr rtlCol="0" anchor="ctr"/>
+                <a:lstStyle/>
+                <a:p>
+                  <a:pPr algn="ctr"/>
+                  <a:endParaRPr lang="en-US"/>
+                </a:p>
+              </p:txBody>
+            </p:sp>
+            <p:sp>
+              <p:nvSpPr>
+                <p:cNvPr id="43" name="Rectangle 42"/>
+                <p:cNvSpPr/>
+                <p:nvPr/>
+              </p:nvSpPr>
+              <p:spPr>
+                <a:xfrm rot="5400000">
+                  <a:off x="3919633" y="4857785"/>
+                  <a:ext cx="146437" cy="55830"/>
+                </a:xfrm>
+                <a:prstGeom prst="rect">
+                  <a:avLst/>
+                </a:prstGeom>
+                <a:solidFill>
+                  <a:srgbClr val="CCFFCC"/>
+                </a:solidFill>
+                <a:ln>
+                  <a:solidFill>
+                    <a:schemeClr val="tx1"/>
+                  </a:solidFill>
+                </a:ln>
+                <a:effectLst/>
+              </p:spPr>
+              <p:style>
+                <a:lnRef idx="1">
+                  <a:schemeClr val="accent1"/>
+                </a:lnRef>
+                <a:fillRef idx="3">
+                  <a:schemeClr val="accent1"/>
+                </a:fillRef>
+                <a:effectRef idx="2">
+                  <a:schemeClr val="accent1"/>
+                </a:effectRef>
+                <a:fontRef idx="minor">
+                  <a:schemeClr val="lt1"/>
+                </a:fontRef>
+              </p:style>
+              <p:txBody>
+                <a:bodyPr rtlCol="0" anchor="ctr"/>
+                <a:lstStyle/>
+                <a:p>
+                  <a:pPr algn="ctr"/>
+                  <a:endParaRPr lang="en-US"/>
+                </a:p>
+              </p:txBody>
+            </p:sp>
+            <p:sp>
+              <p:nvSpPr>
+                <p:cNvPr id="44" name="Rectangle 43"/>
+                <p:cNvSpPr/>
+                <p:nvPr/>
+              </p:nvSpPr>
+              <p:spPr>
+                <a:xfrm rot="5400000">
+                  <a:off x="3919633" y="5101791"/>
+                  <a:ext cx="146437" cy="55830"/>
+                </a:xfrm>
+                <a:prstGeom prst="rect">
+                  <a:avLst/>
+                </a:prstGeom>
+                <a:solidFill>
+                  <a:srgbClr val="CCFFCC"/>
+                </a:solidFill>
+                <a:ln>
+                  <a:solidFill>
+                    <a:schemeClr val="tx1"/>
+                  </a:solidFill>
+                </a:ln>
+                <a:effectLst/>
+              </p:spPr>
+              <p:style>
+                <a:lnRef idx="1">
+                  <a:schemeClr val="accent1"/>
+                </a:lnRef>
+                <a:fillRef idx="3">
+                  <a:schemeClr val="accent1"/>
+                </a:fillRef>
+                <a:effectRef idx="2">
+                  <a:schemeClr val="accent1"/>
+                </a:effectRef>
+                <a:fontRef idx="minor">
+                  <a:schemeClr val="lt1"/>
+                </a:fontRef>
+              </p:style>
+              <p:txBody>
+                <a:bodyPr rtlCol="0" anchor="ctr"/>
+                <a:lstStyle/>
+                <a:p>
+                  <a:pPr algn="ctr"/>
+                  <a:endParaRPr lang="en-US"/>
+                </a:p>
+              </p:txBody>
+            </p:sp>
+          </p:grpSp>
+          <p:sp>
+            <p:nvSpPr>
+              <p:cNvPr id="56" name="TextBox 55"/>
+              <p:cNvSpPr txBox="1"/>
+              <p:nvPr/>
+            </p:nvSpPr>
+            <p:spPr>
+              <a:xfrm>
+                <a:off x="4075669" y="6842737"/>
+                <a:ext cx="971985" cy="209133"/>
+              </a:xfrm>
+              <a:prstGeom prst="rect">
+                <a:avLst/>
+              </a:prstGeom>
+              <a:noFill/>
+            </p:spPr>
+            <p:txBody>
+              <a:bodyPr wrap="square" rtlCol="0">
+                <a:spAutoFit/>
+              </a:bodyPr>
+              <a:lstStyle/>
+              <a:p>
+                <a:pPr algn="ctr"/>
+                <a:r>
+                  <a:rPr lang="en-US" sz="1400" dirty="0" smtClean="0"/>
+                  <a:t>Exchange</a:t>
+                </a:r>
+                <a:endParaRPr lang="en-US" sz="1400" dirty="0"/>
+              </a:p>
+            </p:txBody>
+          </p:sp>
+        </p:grpSp>
+        <p:grpSp>
+          <p:nvGrpSpPr>
+            <p:cNvPr id="69" name="Group 68"/>
+            <p:cNvGrpSpPr/>
+            <p:nvPr/>
+          </p:nvGrpSpPr>
+          <p:grpSpPr>
+            <a:xfrm>
+              <a:off x="3756209" y="8203741"/>
+              <a:ext cx="1632261" cy="327140"/>
+              <a:chOff x="3560196" y="9870560"/>
+              <a:chExt cx="1356505" cy="271872"/>
+            </a:xfrm>
+          </p:grpSpPr>
+          <p:sp>
+            <p:nvSpPr>
+              <p:cNvPr id="58" name="Left Bracket 57"/>
+              <p:cNvSpPr/>
+              <p:nvPr/>
+            </p:nvSpPr>
+            <p:spPr>
+              <a:xfrm rot="16200000">
+                <a:off x="4128572" y="9335028"/>
+                <a:ext cx="219753" cy="1356505"/>
+              </a:xfrm>
+              <a:prstGeom prst="leftBracket">
+                <a:avLst/>
+              </a:prstGeom>
+              <a:ln>
+                <a:solidFill>
+                  <a:schemeClr val="tx1"/>
+                </a:solidFill>
+              </a:ln>
+              <a:effectLst/>
+            </p:spPr>
+            <p:style>
+              <a:lnRef idx="2">
+                <a:schemeClr val="accent1"/>
+              </a:lnRef>
+              <a:fillRef idx="0">
+                <a:schemeClr val="accent1"/>
+              </a:fillRef>
+              <a:effectRef idx="1">
+                <a:schemeClr val="accent1"/>
+              </a:effectRef>
+              <a:fontRef idx="minor">
+                <a:schemeClr val="tx1"/>
+              </a:fontRef>
+            </p:style>
+            <p:txBody>
+              <a:bodyPr rtlCol="0" anchor="ctr"/>
+              <a:lstStyle/>
+              <a:p>
+                <a:pPr algn="ctr"/>
+                <a:endParaRPr lang="en-US"/>
+              </a:p>
+            </p:txBody>
+          </p:sp>
+          <p:sp>
+            <p:nvSpPr>
+              <p:cNvPr id="59" name="TextBox 58"/>
+              <p:cNvSpPr txBox="1"/>
+              <p:nvPr/>
+            </p:nvSpPr>
+            <p:spPr>
+              <a:xfrm>
+                <a:off x="3619924" y="9870560"/>
+                <a:ext cx="1228476" cy="271872"/>
+              </a:xfrm>
+              <a:prstGeom prst="rect">
+                <a:avLst/>
+              </a:prstGeom>
+              <a:noFill/>
+            </p:spPr>
+            <p:txBody>
+              <a:bodyPr wrap="square" rtlCol="0">
+                <a:spAutoFit/>
+              </a:bodyPr>
+              <a:lstStyle/>
+              <a:p>
+                <a:pPr algn="ctr"/>
+                <a:r>
+                  <a:rPr lang="en-US" sz="2000" dirty="0" smtClean="0"/>
+                  <a:t>Stay</a:t>
+                </a:r>
+                <a:endParaRPr lang="en-US" sz="2000" dirty="0"/>
+              </a:p>
+            </p:txBody>
+          </p:sp>
+        </p:grpSp>
+        <p:grpSp>
+          <p:nvGrpSpPr>
+            <p:cNvPr id="68" name="Group 67"/>
+            <p:cNvGrpSpPr/>
+            <p:nvPr/>
+          </p:nvGrpSpPr>
+          <p:grpSpPr>
+            <a:xfrm>
+              <a:off x="6567364" y="8203739"/>
+              <a:ext cx="1632264" cy="327140"/>
+              <a:chOff x="5896431" y="9870559"/>
+              <a:chExt cx="1356507" cy="271872"/>
+            </a:xfrm>
+          </p:grpSpPr>
+          <p:sp>
+            <p:nvSpPr>
+              <p:cNvPr id="60" name="Left Bracket 59"/>
+              <p:cNvSpPr/>
+              <p:nvPr/>
+            </p:nvSpPr>
+            <p:spPr>
+              <a:xfrm rot="16200000">
+                <a:off x="6464808" y="9335026"/>
+                <a:ext cx="219753" cy="1356507"/>
+              </a:xfrm>
+              <a:prstGeom prst="leftBracket">
+                <a:avLst/>
+              </a:prstGeom>
+              <a:ln>
+                <a:solidFill>
+                  <a:schemeClr val="tx1"/>
+                </a:solidFill>
+              </a:ln>
+              <a:effectLst/>
+            </p:spPr>
+            <p:style>
+              <a:lnRef idx="2">
+                <a:schemeClr val="accent1"/>
+              </a:lnRef>
+              <a:fillRef idx="0">
+                <a:schemeClr val="accent1"/>
+              </a:fillRef>
+              <a:effectRef idx="1">
+                <a:schemeClr val="accent1"/>
+              </a:effectRef>
+              <a:fontRef idx="minor">
+                <a:schemeClr val="tx1"/>
+              </a:fontRef>
+            </p:style>
+            <p:txBody>
+              <a:bodyPr rtlCol="0" anchor="ctr"/>
+              <a:lstStyle/>
+              <a:p>
+                <a:pPr algn="ctr"/>
+                <a:endParaRPr lang="en-US"/>
+              </a:p>
+            </p:txBody>
+          </p:sp>
+          <p:sp>
+            <p:nvSpPr>
+              <p:cNvPr id="61" name="TextBox 60"/>
+              <p:cNvSpPr txBox="1"/>
+              <p:nvPr/>
+            </p:nvSpPr>
+            <p:spPr>
+              <a:xfrm>
+                <a:off x="5956160" y="9870559"/>
+                <a:ext cx="1228476" cy="271872"/>
+              </a:xfrm>
+              <a:prstGeom prst="rect">
+                <a:avLst/>
+              </a:prstGeom>
+              <a:noFill/>
+            </p:spPr>
+            <p:txBody>
+              <a:bodyPr wrap="square" rtlCol="0">
+                <a:spAutoFit/>
+              </a:bodyPr>
+              <a:lstStyle/>
+              <a:p>
+                <a:pPr algn="ctr"/>
+                <a:r>
+                  <a:rPr lang="en-US" sz="2000" dirty="0" smtClean="0"/>
+                  <a:t>Switch</a:t>
+                </a:r>
+                <a:endParaRPr lang="en-US" sz="2000" dirty="0"/>
+              </a:p>
+            </p:txBody>
+          </p:sp>
+        </p:grpSp>
+        <p:grpSp>
+          <p:nvGrpSpPr>
+            <p:cNvPr id="70" name="Group 69"/>
+            <p:cNvGrpSpPr/>
+            <p:nvPr/>
+          </p:nvGrpSpPr>
+          <p:grpSpPr>
+            <a:xfrm>
+              <a:off x="4571349" y="8542301"/>
+              <a:ext cx="3628279" cy="327140"/>
+              <a:chOff x="4237625" y="10151923"/>
+              <a:chExt cx="3015313" cy="271877"/>
+            </a:xfrm>
+          </p:grpSpPr>
+          <p:sp>
+            <p:nvSpPr>
+              <p:cNvPr id="62" name="Left Bracket 61"/>
+              <p:cNvSpPr/>
+              <p:nvPr/>
+            </p:nvSpPr>
+            <p:spPr>
+              <a:xfrm rot="16200000">
+                <a:off x="5635405" y="8786981"/>
+                <a:ext cx="219753" cy="3015313"/>
+              </a:xfrm>
+              <a:prstGeom prst="leftBracket">
+                <a:avLst/>
+              </a:prstGeom>
+              <a:ln>
+                <a:solidFill>
+                  <a:schemeClr val="tx1"/>
+                </a:solidFill>
+              </a:ln>
+              <a:effectLst/>
+            </p:spPr>
+            <p:style>
+              <a:lnRef idx="2">
+                <a:schemeClr val="accent1"/>
+              </a:lnRef>
+              <a:fillRef idx="0">
+                <a:schemeClr val="accent1"/>
+              </a:fillRef>
+              <a:effectRef idx="1">
+                <a:schemeClr val="accent1"/>
+              </a:effectRef>
+              <a:fontRef idx="minor">
+                <a:schemeClr val="tx1"/>
+              </a:fontRef>
+            </p:style>
+            <p:txBody>
+              <a:bodyPr rtlCol="0" anchor="ctr"/>
+              <a:lstStyle/>
+              <a:p>
+                <a:pPr algn="ctr"/>
+                <a:endParaRPr lang="en-US"/>
+              </a:p>
+            </p:txBody>
+          </p:sp>
+          <p:sp>
+            <p:nvSpPr>
+              <p:cNvPr id="63" name="TextBox 62"/>
+              <p:cNvSpPr txBox="1"/>
+              <p:nvPr/>
+            </p:nvSpPr>
+            <p:spPr>
+              <a:xfrm>
+                <a:off x="4284804" y="10151923"/>
+                <a:ext cx="2899832" cy="271877"/>
+              </a:xfrm>
+              <a:prstGeom prst="rect">
+                <a:avLst/>
+              </a:prstGeom>
+              <a:noFill/>
+            </p:spPr>
+            <p:txBody>
+              <a:bodyPr wrap="square" rtlCol="0">
+                <a:spAutoFit/>
+              </a:bodyPr>
+              <a:lstStyle/>
+              <a:p>
+                <a:pPr algn="ctr"/>
+                <a:r>
+                  <a:rPr lang="en-US" sz="2000" dirty="0" smtClean="0"/>
+                  <a:t>Exchange</a:t>
+                </a:r>
+              </a:p>
+            </p:txBody>
+          </p:sp>
+        </p:grpSp>
+        <p:sp>
+          <p:nvSpPr>
+            <p:cNvPr id="72" name="TextBox 71"/>
+            <p:cNvSpPr txBox="1"/>
+            <p:nvPr/>
+          </p:nvSpPr>
+          <p:spPr>
+            <a:xfrm rot="16200000">
+              <a:off x="666136" y="6136332"/>
+              <a:ext cx="3336971" cy="390051"/>
+            </a:xfrm>
+            <a:prstGeom prst="rect">
+              <a:avLst/>
+            </a:prstGeom>
+            <a:noFill/>
+          </p:spPr>
+          <p:txBody>
+            <a:bodyPr wrap="square" rtlCol="0">
+              <a:spAutoFit/>
+            </a:bodyPr>
+            <a:lstStyle/>
+            <a:p>
+              <a:pPr algn="ctr"/>
+              <a:r>
+                <a:rPr lang="en-US" dirty="0" smtClean="0"/>
+                <a:t>Reaction time (ms)</a:t>
+              </a:r>
+              <a:endParaRPr lang="en-US" dirty="0"/>
+            </a:p>
+          </p:txBody>
+        </p:sp>
+        <p:sp>
+          <p:nvSpPr>
+            <p:cNvPr id="75" name="TextBox 74"/>
+            <p:cNvSpPr txBox="1"/>
+            <p:nvPr/>
+          </p:nvSpPr>
+          <p:spPr>
+            <a:xfrm>
+              <a:off x="2509560" y="7830566"/>
+              <a:ext cx="496650" cy="276810"/>
+            </a:xfrm>
+            <a:prstGeom prst="rect">
+              <a:avLst/>
+            </a:prstGeom>
+            <a:noFill/>
+          </p:spPr>
+          <p:txBody>
+            <a:bodyPr wrap="square" rtlCol="0">
+              <a:spAutoFit/>
+            </a:bodyPr>
+            <a:lstStyle/>
+            <a:p>
+              <a:pPr algn="r"/>
+              <a:r>
+                <a:rPr lang="en-US" sz="1600" dirty="0" smtClean="0"/>
+                <a:t>600</a:t>
+              </a:r>
+              <a:endParaRPr lang="en-US" sz="1600" dirty="0"/>
+            </a:p>
+          </p:txBody>
+        </p:sp>
+        <p:sp>
+          <p:nvSpPr>
+            <p:cNvPr id="76" name="TextBox 75"/>
+            <p:cNvSpPr txBox="1"/>
+            <p:nvPr/>
+          </p:nvSpPr>
+          <p:spPr>
+            <a:xfrm>
+              <a:off x="2509560" y="6712590"/>
+              <a:ext cx="496650" cy="276810"/>
+            </a:xfrm>
+            <a:prstGeom prst="rect">
+              <a:avLst/>
+            </a:prstGeom>
+            <a:noFill/>
+          </p:spPr>
+          <p:txBody>
+            <a:bodyPr wrap="square" rtlCol="0">
+              <a:spAutoFit/>
+            </a:bodyPr>
+            <a:lstStyle/>
+            <a:p>
+              <a:pPr algn="r"/>
+              <a:r>
+                <a:rPr lang="en-US" sz="1600" dirty="0" smtClean="0"/>
+                <a:t>800</a:t>
+              </a:r>
+              <a:endParaRPr lang="en-US" sz="1600" dirty="0"/>
+            </a:p>
+          </p:txBody>
+        </p:sp>
+        <p:sp>
+          <p:nvSpPr>
+            <p:cNvPr id="77" name="TextBox 76"/>
+            <p:cNvSpPr txBox="1"/>
+            <p:nvPr/>
+          </p:nvSpPr>
+          <p:spPr>
+            <a:xfrm>
+              <a:off x="2405565" y="5637435"/>
+              <a:ext cx="600645" cy="276810"/>
+            </a:xfrm>
+            <a:prstGeom prst="rect">
+              <a:avLst/>
+            </a:prstGeom>
+            <a:noFill/>
+          </p:spPr>
+          <p:txBody>
+            <a:bodyPr wrap="square" rtlCol="0">
+              <a:spAutoFit/>
+            </a:bodyPr>
+            <a:lstStyle/>
+            <a:p>
+              <a:pPr algn="r"/>
+              <a:r>
+                <a:rPr lang="en-US" sz="1600" dirty="0" smtClean="0"/>
+                <a:t>1000</a:t>
+              </a:r>
+              <a:endParaRPr lang="en-US" sz="1600" dirty="0"/>
+            </a:p>
+          </p:txBody>
+        </p:sp>
+        <p:sp>
+          <p:nvSpPr>
+            <p:cNvPr id="81" name="TextBox 80"/>
+            <p:cNvSpPr txBox="1"/>
+            <p:nvPr/>
+          </p:nvSpPr>
+          <p:spPr>
+            <a:xfrm>
+              <a:off x="2405565" y="4519459"/>
+              <a:ext cx="600645" cy="276810"/>
+            </a:xfrm>
+            <a:prstGeom prst="rect">
+              <a:avLst/>
+            </a:prstGeom>
+            <a:noFill/>
+          </p:spPr>
+          <p:txBody>
+            <a:bodyPr wrap="square" rtlCol="0">
+              <a:spAutoFit/>
+            </a:bodyPr>
+            <a:lstStyle/>
+            <a:p>
+              <a:pPr algn="r"/>
+              <a:r>
+                <a:rPr lang="en-US" sz="1600" dirty="0" smtClean="0"/>
+                <a:t>1200</a:t>
+              </a:r>
+              <a:endParaRPr lang="en-US" sz="1600" dirty="0"/>
+            </a:p>
+          </p:txBody>
+        </p:sp>
+        <p:cxnSp>
+          <p:nvCxnSpPr>
+            <p:cNvPr id="84" name="Straight Connector 83"/>
+            <p:cNvCxnSpPr/>
+            <p:nvPr/>
+          </p:nvCxnSpPr>
+          <p:spPr>
+            <a:xfrm>
+              <a:off x="3006210" y="8007526"/>
+              <a:ext cx="5359354" cy="1588"/>
+            </a:xfrm>
+            <a:prstGeom prst="line">
+              <a:avLst/>
+            </a:prstGeom>
+            <a:ln>
+              <a:solidFill>
+                <a:schemeClr val="tx1"/>
+              </a:solidFill>
+            </a:ln>
+            <a:effectLst/>
+          </p:spPr>
+          <p:style>
+            <a:lnRef idx="2">
+              <a:schemeClr val="accent1"/>
+            </a:lnRef>
+            <a:fillRef idx="0">
+              <a:schemeClr val="accent1"/>
+            </a:fillRef>
+            <a:effectRef idx="1">
+              <a:schemeClr val="accent1"/>
+            </a:effectRef>
+            <a:fontRef idx="minor">
+              <a:schemeClr val="tx1"/>
+            </a:fontRef>
+          </p:style>
+        </p:cxnSp>
+      </p:grpSp>
+      <p:sp>
+        <p:nvSpPr>
+          <p:cNvPr id="18" name="TextBox 17"/>
+          <p:cNvSpPr txBox="1"/>
+          <p:nvPr/>
+        </p:nvSpPr>
+        <p:spPr>
+          <a:xfrm>
+            <a:off x="947733" y="540491"/>
+            <a:ext cx="1739894" cy="338548"/>
+          </a:xfrm>
+          <a:prstGeom prst="rect">
+            <a:avLst/>
+          </a:prstGeom>
+          <a:noFill/>
+        </p:spPr>
+        <p:txBody>
+          <a:bodyPr wrap="square" lIns="91430" tIns="45717" rIns="91430" bIns="45717" rtlCol="0">
+            <a:spAutoFit/>
+          </a:bodyPr>
+          <a:lstStyle/>
+          <a:p>
+            <a:pPr algn="ctr"/>
+            <a:r>
+              <a:rPr lang="en-US" sz="1600" dirty="0" smtClean="0"/>
+              <a:t>3 ± 3.5</a:t>
+            </a:r>
+            <a:endParaRPr lang="en-US" sz="1600" dirty="0"/>
+          </a:p>
+        </p:txBody>
+      </p:sp>
+      <p:sp>
+        <p:nvSpPr>
+          <p:cNvPr id="26" name="TextBox 25"/>
+          <p:cNvSpPr txBox="1"/>
+          <p:nvPr/>
+        </p:nvSpPr>
+        <p:spPr>
+          <a:xfrm>
+            <a:off x="407923" y="397790"/>
+            <a:ext cx="464415" cy="646331"/>
+          </a:xfrm>
+          <a:prstGeom prst="rect">
+            <a:avLst/>
+          </a:prstGeom>
+          <a:noFill/>
+        </p:spPr>
+        <p:txBody>
+          <a:bodyPr wrap="none" rtlCol="0">
+            <a:spAutoFit/>
+          </a:bodyPr>
+          <a:lstStyle/>
+          <a:p>
+            <a:pPr algn="ctr"/>
+            <a:r>
+              <a:rPr lang="en-US" sz="3600" b="1" dirty="0" smtClean="0"/>
+              <a:t>A</a:t>
+            </a:r>
+            <a:endParaRPr lang="en-US" sz="3600" b="1" dirty="0"/>
+          </a:p>
+        </p:txBody>
+      </p:sp>
+      <p:grpSp>
+        <p:nvGrpSpPr>
+          <p:cNvPr id="80" name="Group 79"/>
+          <p:cNvGrpSpPr/>
+          <p:nvPr/>
+        </p:nvGrpSpPr>
+        <p:grpSpPr>
+          <a:xfrm>
+            <a:off x="1059125" y="540491"/>
+            <a:ext cx="8127838" cy="3697589"/>
+            <a:chOff x="1059125" y="540491"/>
+            <a:chExt cx="8127838" cy="3697589"/>
           </a:xfrm>
         </p:grpSpPr>
         <p:pic>
@@ -3087,15 +4643,15 @@
             <p:nvPr/>
           </p:nvPicPr>
           <p:blipFill>
-            <a:blip r:embed="rId2"/>
+            <a:blip r:embed="rId4"/>
             <a:stretch>
               <a:fillRect/>
             </a:stretch>
           </p:blipFill>
           <p:spPr>
             <a:xfrm>
-              <a:off x="9471498" y="7048228"/>
-              <a:ext cx="1459826" cy="1459828"/>
+              <a:off x="1163502" y="1260456"/>
+              <a:ext cx="1210278" cy="1210279"/>
             </a:xfrm>
             <a:prstGeom prst="roundRect">
               <a:avLst/>
@@ -3111,15 +4667,15 @@
             <p:nvPr/>
           </p:nvPicPr>
           <p:blipFill>
-            <a:blip r:embed="rId3"/>
+            <a:blip r:embed="rId5"/>
             <a:stretch>
               <a:fillRect/>
             </a:stretch>
           </p:blipFill>
           <p:spPr>
             <a:xfrm>
-              <a:off x="15302698" y="7048228"/>
-              <a:ext cx="1459826" cy="1459828"/>
+              <a:off x="6498757" y="1260456"/>
+              <a:ext cx="1210278" cy="1210279"/>
             </a:xfrm>
             <a:prstGeom prst="roundRect">
               <a:avLst/>
@@ -3135,15 +4691,15 @@
             <p:nvPr/>
           </p:nvPicPr>
           <p:blipFill>
-            <a:blip r:embed="rId4"/>
+            <a:blip r:embed="rId6"/>
             <a:stretch>
               <a:fillRect/>
             </a:stretch>
           </p:blipFill>
           <p:spPr>
             <a:xfrm>
-              <a:off x="15302694" y="9183892"/>
-              <a:ext cx="1455914" cy="1455918"/>
+              <a:off x="6502000" y="3031042"/>
+              <a:ext cx="1207035" cy="1207038"/>
             </a:xfrm>
             <a:prstGeom prst="roundRect">
               <a:avLst/>
@@ -3159,15 +4715,15 @@
             <p:nvPr/>
           </p:nvPicPr>
           <p:blipFill>
-            <a:blip r:embed="rId5"/>
+            <a:blip r:embed="rId7"/>
             <a:stretch>
               <a:fillRect/>
             </a:stretch>
           </p:blipFill>
           <p:spPr>
             <a:xfrm>
-              <a:off x="10931329" y="7048228"/>
-              <a:ext cx="1459826" cy="1459828"/>
+              <a:off x="2373785" y="1260456"/>
+              <a:ext cx="1210278" cy="1210279"/>
             </a:xfrm>
             <a:prstGeom prst="roundRect">
               <a:avLst/>
@@ -3183,39 +4739,15 @@
             <p:nvPr/>
           </p:nvPicPr>
           <p:blipFill>
-            <a:blip r:embed="rId6"/>
+            <a:blip r:embed="rId8"/>
             <a:stretch>
               <a:fillRect/>
             </a:stretch>
           </p:blipFill>
           <p:spPr>
             <a:xfrm>
-              <a:off x="12391152" y="7052429"/>
-              <a:ext cx="1455625" cy="1455627"/>
-            </a:xfrm>
-            <a:prstGeom prst="roundRect">
-              <a:avLst/>
-            </a:prstGeom>
-          </p:spPr>
-        </p:pic>
-        <p:pic>
-          <p:nvPicPr>
-            <p:cNvPr id="10" name="Picture 9" descr="big 3 elbow.png"/>
-            <p:cNvPicPr>
-              <a:picLocks noChangeAspect="1"/>
-            </p:cNvPicPr>
-            <p:nvPr/>
-          </p:nvPicPr>
-          <p:blipFill>
-            <a:blip r:embed="rId7"/>
-            <a:stretch>
-              <a:fillRect/>
-            </a:stretch>
-          </p:blipFill>
-          <p:spPr>
-            <a:xfrm>
-              <a:off x="13846779" y="7052432"/>
-              <a:ext cx="1455914" cy="1455918"/>
+              <a:off x="3584061" y="1263939"/>
+              <a:ext cx="1206795" cy="1206797"/>
             </a:xfrm>
             <a:prstGeom prst="roundRect">
               <a:avLst/>
@@ -3230,8 +4762,8 @@
           </p:nvCxnSpPr>
           <p:spPr>
             <a:xfrm>
-              <a:off x="9471499" y="6617351"/>
-              <a:ext cx="7287110" cy="1408"/>
+              <a:off x="1163503" y="903235"/>
+              <a:ext cx="7264081" cy="1588"/>
             </a:xfrm>
             <a:prstGeom prst="straightConnector1">
               <a:avLst/>
@@ -3267,8 +4799,8 @@
           </p:nvSpPr>
           <p:spPr>
             <a:xfrm>
-              <a:off x="14435907" y="6597136"/>
-              <a:ext cx="3115305" cy="408353"/>
+              <a:off x="1517784" y="886476"/>
+              <a:ext cx="2582764" cy="338548"/>
             </a:xfrm>
             <a:prstGeom prst="rect">
               <a:avLst/>
@@ -3281,7 +4813,6 @@
             </a:bodyPr>
             <a:lstStyle/>
             <a:p>
-              <a:pPr algn="ctr"/>
               <a:r>
                 <a:rPr lang="en-US" sz="1600" dirty="0" smtClean="0"/>
                 <a:t>time (seconds)</a:t>
@@ -3298,8 +4829,8 @@
           </p:nvSpPr>
           <p:spPr>
             <a:xfrm>
-              <a:off x="11478460" y="8665546"/>
-              <a:ext cx="359511" cy="178074"/>
+              <a:off x="2827387" y="2601304"/>
+              <a:ext cx="298055" cy="147633"/>
             </a:xfrm>
             <a:prstGeom prst="homePlate">
               <a:avLst/>
@@ -3345,8 +4876,8 @@
           </p:nvSpPr>
           <p:spPr>
             <a:xfrm rot="16200000">
-              <a:off x="12946146" y="8665545"/>
-              <a:ext cx="359512" cy="178077"/>
+              <a:off x="4044182" y="2601303"/>
+              <a:ext cx="298056" cy="147636"/>
             </a:xfrm>
             <a:prstGeom prst="homePlate">
               <a:avLst/>
@@ -3395,8 +4926,8 @@
           </p:nvSpPr>
           <p:spPr>
             <a:xfrm>
-              <a:off x="14392721" y="8665546"/>
-              <a:ext cx="359511" cy="178074"/>
+              <a:off x="5746111" y="2601304"/>
+              <a:ext cx="298055" cy="147633"/>
             </a:xfrm>
             <a:prstGeom prst="homePlate">
               <a:avLst/>
@@ -3445,8 +4976,8 @@
           </p:nvSpPr>
           <p:spPr>
             <a:xfrm rot="5400000">
-              <a:off x="13765929" y="8415724"/>
-              <a:ext cx="879410" cy="2194124"/>
+              <a:off x="4642049" y="2029794"/>
+              <a:ext cx="730691" cy="2549451"/>
             </a:xfrm>
             <a:prstGeom prst="bentUpArrow">
               <a:avLst>
@@ -3494,8 +5025,8 @@
           </p:nvSpPr>
           <p:spPr>
             <a:xfrm>
-              <a:off x="13341215" y="9954432"/>
-              <a:ext cx="1834491" cy="1002334"/>
+              <a:off x="3749030" y="3300837"/>
+              <a:ext cx="2372562" cy="338548"/>
             </a:xfrm>
             <a:prstGeom prst="rect">
               <a:avLst/>
@@ -3510,38 +5041,7 @@
             <a:p>
               <a:r>
                 <a:rPr lang="en-US" sz="1600" dirty="0" smtClean="0"/>
-                <a:t>around 50% journeys cancelled</a:t>
-              </a:r>
-              <a:endParaRPr lang="en-US" sz="1600" dirty="0"/>
-            </a:p>
-          </p:txBody>
-        </p:sp>
-        <p:sp>
-          <p:nvSpPr>
-            <p:cNvPr id="18" name="TextBox 17"/>
-            <p:cNvSpPr txBox="1"/>
-            <p:nvPr/>
-          </p:nvSpPr>
-          <p:spPr>
-            <a:xfrm>
-              <a:off x="9211239" y="6179810"/>
-              <a:ext cx="2098643" cy="408353"/>
-            </a:xfrm>
-            <a:prstGeom prst="rect">
-              <a:avLst/>
-            </a:prstGeom>
-            <a:noFill/>
-          </p:spPr>
-          <p:txBody>
-            <a:bodyPr wrap="square" lIns="91430" tIns="45717" rIns="91430" bIns="45717" rtlCol="0">
-              <a:spAutoFit/>
-            </a:bodyPr>
-            <a:lstStyle/>
-            <a:p>
-              <a:pPr algn="ctr"/>
-              <a:r>
-                <a:rPr lang="en-US" sz="1600" dirty="0" smtClean="0"/>
-                <a:t>3 ± 3.5</a:t>
+                <a:t>50% journeys cancelled</a:t>
               </a:r>
               <a:endParaRPr lang="en-US" sz="1600" dirty="0"/>
             </a:p>
@@ -3555,8 +5055,8 @@
           </p:nvSpPr>
           <p:spPr>
             <a:xfrm>
-              <a:off x="10704050" y="6179811"/>
-              <a:ext cx="1957189" cy="408353"/>
+              <a:off x="2185358" y="540492"/>
+              <a:ext cx="1622620" cy="338548"/>
             </a:xfrm>
             <a:prstGeom prst="rect">
               <a:avLst/>
@@ -3586,8 +5086,8 @@
           </p:nvSpPr>
           <p:spPr>
             <a:xfrm>
-              <a:off x="12134761" y="6179810"/>
-              <a:ext cx="1951134" cy="408353"/>
+              <a:off x="3371498" y="540492"/>
+              <a:ext cx="1617600" cy="338548"/>
             </a:xfrm>
             <a:prstGeom prst="rect">
               <a:avLst/>
@@ -3617,8 +5117,8 @@
           </p:nvSpPr>
           <p:spPr>
             <a:xfrm>
-              <a:off x="13572793" y="6179810"/>
-              <a:ext cx="1951134" cy="408353"/>
+              <a:off x="5086711" y="540491"/>
+              <a:ext cx="1617600" cy="338548"/>
             </a:xfrm>
             <a:prstGeom prst="rect">
               <a:avLst/>
@@ -3648,8 +5148,8 @@
           </p:nvSpPr>
           <p:spPr>
             <a:xfrm>
-              <a:off x="14841519" y="6179811"/>
-              <a:ext cx="2487131" cy="408353"/>
+              <a:off x="6075916" y="540491"/>
+              <a:ext cx="2061972" cy="338548"/>
             </a:xfrm>
             <a:prstGeom prst="rect">
               <a:avLst/>
@@ -3679,8 +5179,8 @@
           </p:nvCxnSpPr>
           <p:spPr>
             <a:xfrm>
-              <a:off x="10931322" y="9071672"/>
-              <a:ext cx="4372652" cy="1408"/>
+              <a:off x="2990995" y="2939596"/>
+              <a:ext cx="2852144" cy="1588"/>
             </a:xfrm>
             <a:prstGeom prst="line">
               <a:avLst/>
@@ -3715,8 +5215,8 @@
           </p:nvSpPr>
           <p:spPr>
             <a:xfrm>
-              <a:off x="9345600" y="8475698"/>
-              <a:ext cx="1749501" cy="408353"/>
+              <a:off x="1059125" y="2443909"/>
+              <a:ext cx="1450435" cy="338548"/>
             </a:xfrm>
             <a:prstGeom prst="rect">
               <a:avLst/>
@@ -3754,8 +5254,8 @@
           </p:nvSpPr>
           <p:spPr>
             <a:xfrm>
-              <a:off x="15175704" y="8475698"/>
-              <a:ext cx="1749501" cy="408353"/>
+              <a:off x="6396644" y="2443918"/>
+              <a:ext cx="1450435" cy="338548"/>
             </a:xfrm>
             <a:prstGeom prst="rect">
               <a:avLst/>
@@ -3785,38 +5285,117 @@
             </a:p>
           </p:txBody>
         </p:sp>
+        <p:pic>
+          <p:nvPicPr>
+            <p:cNvPr id="73" name="Picture 72" descr="big 3 elbow.png"/>
+            <p:cNvPicPr>
+              <a:picLocks noChangeAspect="1"/>
+            </p:cNvPicPr>
+            <p:nvPr/>
+          </p:nvPicPr>
+          <p:blipFill>
+            <a:blip r:embed="rId9"/>
+            <a:stretch>
+              <a:fillRect/>
+            </a:stretch>
+          </p:blipFill>
+          <p:spPr>
+            <a:xfrm>
+              <a:off x="5290660" y="1260456"/>
+              <a:ext cx="1207035" cy="1207038"/>
+            </a:xfrm>
+            <a:prstGeom prst="roundRect">
+              <a:avLst/>
+            </a:prstGeom>
+          </p:spPr>
+        </p:pic>
+        <p:sp>
+          <p:nvSpPr>
+            <p:cNvPr id="74" name="TextBox 73"/>
+            <p:cNvSpPr txBox="1"/>
+            <p:nvPr/>
+          </p:nvSpPr>
+          <p:spPr>
+            <a:xfrm>
+              <a:off x="4225539" y="1696331"/>
+              <a:ext cx="1617600" cy="338548"/>
+            </a:xfrm>
+            <a:prstGeom prst="rect">
+              <a:avLst/>
+            </a:prstGeom>
+            <a:noFill/>
+          </p:spPr>
+          <p:txBody>
+            <a:bodyPr wrap="square" lIns="91430" tIns="45717" rIns="91430" bIns="45717" rtlCol="0">
+              <a:spAutoFit/>
+            </a:bodyPr>
+            <a:lstStyle/>
+            <a:p>
+              <a:pPr algn="ctr"/>
+              <a:r>
+                <a:rPr lang="en-US" sz="1600" dirty="0" smtClean="0"/>
+                <a:t>…</a:t>
+              </a:r>
+              <a:endParaRPr lang="en-US" sz="1600" dirty="0"/>
+            </a:p>
+          </p:txBody>
+        </p:sp>
+        <p:pic>
+          <p:nvPicPr>
+            <p:cNvPr id="78" name="Picture 77" descr="achieved.png"/>
+            <p:cNvPicPr>
+              <a:picLocks noChangeAspect="1"/>
+            </p:cNvPicPr>
+            <p:nvPr/>
+          </p:nvPicPr>
+          <p:blipFill>
+            <a:blip r:embed="rId10"/>
+            <a:stretch>
+              <a:fillRect/>
+            </a:stretch>
+          </p:blipFill>
+          <p:spPr>
+            <a:xfrm>
+              <a:off x="7719195" y="1260456"/>
+              <a:ext cx="1210278" cy="1210278"/>
+            </a:xfrm>
+            <a:prstGeom prst="roundRect">
+              <a:avLst/>
+            </a:prstGeom>
+          </p:spPr>
+        </p:pic>
+        <p:sp>
+          <p:nvSpPr>
+            <p:cNvPr id="79" name="TextBox 78"/>
+            <p:cNvSpPr txBox="1"/>
+            <p:nvPr/>
+          </p:nvSpPr>
+          <p:spPr>
+            <a:xfrm>
+              <a:off x="7447069" y="540491"/>
+              <a:ext cx="1739894" cy="338548"/>
+            </a:xfrm>
+            <a:prstGeom prst="rect">
+              <a:avLst/>
+            </a:prstGeom>
+            <a:noFill/>
+          </p:spPr>
+          <p:txBody>
+            <a:bodyPr wrap="square" lIns="91430" tIns="45717" rIns="91430" bIns="45717" rtlCol="0">
+              <a:spAutoFit/>
+            </a:bodyPr>
+            <a:lstStyle/>
+            <a:p>
+              <a:pPr algn="ctr"/>
+              <a:r>
+                <a:rPr lang="en-US" sz="1600" dirty="0" smtClean="0"/>
+                <a:t>3 ± 3.5</a:t>
+              </a:r>
+              <a:endParaRPr lang="en-US" sz="1600" dirty="0"/>
+            </a:p>
+          </p:txBody>
+        </p:sp>
       </p:grpSp>
-      <p:sp>
-        <p:nvSpPr>
-          <p:cNvPr id="26" name="TextBox 25"/>
-          <p:cNvSpPr txBox="1"/>
-          <p:nvPr/>
-        </p:nvSpPr>
-        <p:spPr>
-          <a:xfrm>
-            <a:off x="1226947" y="1604586"/>
-            <a:ext cx="464415" cy="646331"/>
-          </a:xfrm>
-          <a:prstGeom prst="rect">
-            <a:avLst/>
-          </a:prstGeom>
-          <a:noFill/>
-        </p:spPr>
-        <p:txBody>
-          <a:bodyPr wrap="none" rtlCol="0">
-            <a:spAutoFit/>
-          </a:bodyPr>
-          <a:lstStyle/>
-          <a:p>
-            <a:pPr algn="ctr"/>
-            <a:r>
-              <a:rPr lang="en-US" sz="3600" b="1" dirty="0" smtClean="0"/>
-              <a:t>A</a:t>
-            </a:r>
-            <a:endParaRPr lang="en-US" sz="3600" b="1" dirty="0"/>
-          </a:p>
-        </p:txBody>
-      </p:sp>
       <p:sp>
         <p:nvSpPr>
           <p:cNvPr id="27" name="TextBox 26"/>
@@ -3825,7 +5404,7 @@
         </p:nvSpPr>
         <p:spPr>
           <a:xfrm>
-            <a:off x="1237429" y="5852269"/>
+            <a:off x="418405" y="4238080"/>
             <a:ext cx="443451" cy="646331"/>
           </a:xfrm>
           <a:prstGeom prst="rect">
@@ -3845,1189 +5424,6 @@
               <a:t>B</a:t>
             </a:r>
             <a:endParaRPr lang="en-US" sz="3600" b="1" dirty="0"/>
-          </a:p>
-        </p:txBody>
-      </p:sp>
-      <p:pic>
-        <p:nvPicPr>
-          <p:cNvPr id="28" name="Content Placeholder 39" descr="6_rt.pdf"/>
-          <p:cNvPicPr>
-            <a:picLocks noChangeAspect="1"/>
-          </p:cNvPicPr>
-          <p:nvPr/>
-        </p:nvPicPr>
-        <mc:AlternateContent>
-          <mc:Choice xmlns:ma="http://schemas.microsoft.com/office/mac/drawingml/2008/main" Requires="ma">
-            <p:blipFill>
-              <a:blip r:embed="rId8"/>
-              <a:stretch>
-                <a:fillRect/>
-              </a:stretch>
-            </p:blipFill>
-          </mc:Choice>
-          <mc:Fallback>
-            <p:blipFill>
-              <a:blip r:embed="rId9"/>
-              <a:stretch>
-                <a:fillRect/>
-              </a:stretch>
-            </p:blipFill>
-          </mc:Fallback>
-        </mc:AlternateContent>
-        <p:spPr>
-          <a:xfrm>
-            <a:off x="2272222" y="5829125"/>
-            <a:ext cx="6044671" cy="4522709"/>
-          </a:xfrm>
-          <a:prstGeom prst="rect">
-            <a:avLst/>
-          </a:prstGeom>
-          <a:noFill/>
-          <a:ln>
-            <a:noFill/>
-          </a:ln>
-        </p:spPr>
-      </p:pic>
-      <p:grpSp>
-        <p:nvGrpSpPr>
-          <p:cNvPr id="31" name="Group 30"/>
-          <p:cNvGrpSpPr/>
-          <p:nvPr/>
-        </p:nvGrpSpPr>
-        <p:grpSpPr>
-          <a:xfrm>
-            <a:off x="5953529" y="6277886"/>
-            <a:ext cx="564854" cy="564850"/>
-            <a:chOff x="5108682" y="4740989"/>
-            <a:chExt cx="461665" cy="461665"/>
-          </a:xfrm>
-        </p:grpSpPr>
-        <p:sp>
-          <p:nvSpPr>
-            <p:cNvPr id="32" name="Rounded Rectangle 31"/>
-            <p:cNvSpPr/>
-            <p:nvPr/>
-          </p:nvSpPr>
-          <p:spPr>
-            <a:xfrm>
-              <a:off x="5108682" y="4740989"/>
-              <a:ext cx="461665" cy="461665"/>
-            </a:xfrm>
-            <a:prstGeom prst="roundRect">
-              <a:avLst/>
-            </a:prstGeom>
-            <a:ln>
-              <a:solidFill>
-                <a:schemeClr val="tx1"/>
-              </a:solidFill>
-            </a:ln>
-          </p:spPr>
-          <p:style>
-            <a:lnRef idx="2">
-              <a:schemeClr val="accent1"/>
-            </a:lnRef>
-            <a:fillRef idx="1">
-              <a:schemeClr val="lt1"/>
-            </a:fillRef>
-            <a:effectRef idx="0">
-              <a:schemeClr val="accent1"/>
-            </a:effectRef>
-            <a:fontRef idx="minor">
-              <a:schemeClr val="dk1"/>
-            </a:fontRef>
-          </p:style>
-          <p:txBody>
-            <a:bodyPr rtlCol="0" anchor="ctr"/>
-            <a:lstStyle/>
-            <a:p>
-              <a:pPr algn="ctr"/>
-              <a:endParaRPr lang="en-US"/>
-            </a:p>
-          </p:txBody>
-        </p:sp>
-        <p:sp>
-          <p:nvSpPr>
-            <p:cNvPr id="33" name="Right Arrow 32"/>
-            <p:cNvSpPr/>
-            <p:nvPr/>
-          </p:nvSpPr>
-          <p:spPr>
-            <a:xfrm>
-              <a:off x="5189712" y="4920753"/>
-              <a:ext cx="148612" cy="112692"/>
-            </a:xfrm>
-            <a:prstGeom prst="rightArrow">
-              <a:avLst/>
-            </a:prstGeom>
-            <a:solidFill>
-              <a:srgbClr val="F5BF64"/>
-            </a:solidFill>
-            <a:ln>
-              <a:solidFill>
-                <a:schemeClr val="tx1"/>
-              </a:solidFill>
-            </a:ln>
-            <a:effectLst/>
-          </p:spPr>
-          <p:style>
-            <a:lnRef idx="1">
-              <a:schemeClr val="accent1"/>
-            </a:lnRef>
-            <a:fillRef idx="3">
-              <a:schemeClr val="accent1"/>
-            </a:fillRef>
-            <a:effectRef idx="2">
-              <a:schemeClr val="accent1"/>
-            </a:effectRef>
-            <a:fontRef idx="minor">
-              <a:schemeClr val="lt1"/>
-            </a:fontRef>
-          </p:style>
-          <p:txBody>
-            <a:bodyPr rtlCol="0" anchor="ctr"/>
-            <a:lstStyle/>
-            <a:p>
-              <a:pPr algn="ctr"/>
-              <a:endParaRPr lang="en-US"/>
-            </a:p>
-          </p:txBody>
-        </p:sp>
-        <p:sp>
-          <p:nvSpPr>
-            <p:cNvPr id="34" name="Right Arrow 33"/>
-            <p:cNvSpPr/>
-            <p:nvPr/>
-          </p:nvSpPr>
-          <p:spPr>
-            <a:xfrm rot="16200000">
-              <a:off x="5264018" y="4793166"/>
-              <a:ext cx="148612" cy="112692"/>
-            </a:xfrm>
-            <a:prstGeom prst="rightArrow">
-              <a:avLst/>
-            </a:prstGeom>
-            <a:solidFill>
-              <a:srgbClr val="F5BF64"/>
-            </a:solidFill>
-            <a:ln>
-              <a:solidFill>
-                <a:schemeClr val="tx1"/>
-              </a:solidFill>
-            </a:ln>
-            <a:effectLst/>
-          </p:spPr>
-          <p:style>
-            <a:lnRef idx="1">
-              <a:schemeClr val="accent1"/>
-            </a:lnRef>
-            <a:fillRef idx="3">
-              <a:schemeClr val="accent1"/>
-            </a:fillRef>
-            <a:effectRef idx="2">
-              <a:schemeClr val="accent1"/>
-            </a:effectRef>
-            <a:fontRef idx="minor">
-              <a:schemeClr val="lt1"/>
-            </a:fontRef>
-          </p:style>
-          <p:txBody>
-            <a:bodyPr rtlCol="0" anchor="ctr"/>
-            <a:lstStyle/>
-            <a:p>
-              <a:pPr algn="ctr"/>
-              <a:endParaRPr lang="en-US"/>
-            </a:p>
-          </p:txBody>
-        </p:sp>
-      </p:grpSp>
-      <p:grpSp>
-        <p:nvGrpSpPr>
-          <p:cNvPr id="35" name="Group 34"/>
-          <p:cNvGrpSpPr/>
-          <p:nvPr/>
-        </p:nvGrpSpPr>
-        <p:grpSpPr>
-          <a:xfrm>
-            <a:off x="3613588" y="6277886"/>
-            <a:ext cx="564854" cy="564850"/>
-            <a:chOff x="3246958" y="4775206"/>
-            <a:chExt cx="461665" cy="461665"/>
-          </a:xfrm>
-        </p:grpSpPr>
-        <p:sp>
-          <p:nvSpPr>
-            <p:cNvPr id="36" name="Rounded Rectangle 35"/>
-            <p:cNvSpPr/>
-            <p:nvPr/>
-          </p:nvSpPr>
-          <p:spPr>
-            <a:xfrm>
-              <a:off x="3246958" y="4775206"/>
-              <a:ext cx="461665" cy="461665"/>
-            </a:xfrm>
-            <a:prstGeom prst="roundRect">
-              <a:avLst/>
-            </a:prstGeom>
-            <a:ln>
-              <a:solidFill>
-                <a:schemeClr val="tx1"/>
-              </a:solidFill>
-            </a:ln>
-          </p:spPr>
-          <p:style>
-            <a:lnRef idx="2">
-              <a:schemeClr val="accent1"/>
-            </a:lnRef>
-            <a:fillRef idx="1">
-              <a:schemeClr val="lt1"/>
-            </a:fillRef>
-            <a:effectRef idx="0">
-              <a:schemeClr val="accent1"/>
-            </a:effectRef>
-            <a:fontRef idx="minor">
-              <a:schemeClr val="dk1"/>
-            </a:fontRef>
-          </p:style>
-          <p:txBody>
-            <a:bodyPr rtlCol="0" anchor="ctr"/>
-            <a:lstStyle/>
-            <a:p>
-              <a:pPr algn="ctr"/>
-              <a:endParaRPr lang="en-US"/>
-            </a:p>
-          </p:txBody>
-        </p:sp>
-        <p:sp>
-          <p:nvSpPr>
-            <p:cNvPr id="37" name="Right Arrow 36"/>
-            <p:cNvSpPr/>
-            <p:nvPr/>
-          </p:nvSpPr>
-          <p:spPr>
-            <a:xfrm>
-              <a:off x="3327988" y="4954970"/>
-              <a:ext cx="148612" cy="112692"/>
-            </a:xfrm>
-            <a:prstGeom prst="rightArrow">
-              <a:avLst/>
-            </a:prstGeom>
-            <a:solidFill>
-              <a:srgbClr val="F5BF64"/>
-            </a:solidFill>
-            <a:ln>
-              <a:solidFill>
-                <a:schemeClr val="tx1"/>
-              </a:solidFill>
-            </a:ln>
-            <a:effectLst/>
-          </p:spPr>
-          <p:style>
-            <a:lnRef idx="1">
-              <a:schemeClr val="accent1"/>
-            </a:lnRef>
-            <a:fillRef idx="3">
-              <a:schemeClr val="accent1"/>
-            </a:fillRef>
-            <a:effectRef idx="2">
-              <a:schemeClr val="accent1"/>
-            </a:effectRef>
-            <a:fontRef idx="minor">
-              <a:schemeClr val="lt1"/>
-            </a:fontRef>
-          </p:style>
-          <p:txBody>
-            <a:bodyPr rtlCol="0" anchor="ctr"/>
-            <a:lstStyle/>
-            <a:p>
-              <a:pPr algn="ctr"/>
-              <a:endParaRPr lang="en-US"/>
-            </a:p>
-          </p:txBody>
-        </p:sp>
-        <p:sp>
-          <p:nvSpPr>
-            <p:cNvPr id="38" name="Right Arrow 37"/>
-            <p:cNvSpPr/>
-            <p:nvPr/>
-          </p:nvSpPr>
-          <p:spPr>
-            <a:xfrm>
-              <a:off x="3495666" y="4954970"/>
-              <a:ext cx="148612" cy="112692"/>
-            </a:xfrm>
-            <a:prstGeom prst="rightArrow">
-              <a:avLst/>
-            </a:prstGeom>
-            <a:solidFill>
-              <a:srgbClr val="F5BF64"/>
-            </a:solidFill>
-            <a:ln>
-              <a:solidFill>
-                <a:schemeClr val="tx1"/>
-              </a:solidFill>
-            </a:ln>
-            <a:effectLst/>
-          </p:spPr>
-          <p:style>
-            <a:lnRef idx="1">
-              <a:schemeClr val="accent1"/>
-            </a:lnRef>
-            <a:fillRef idx="3">
-              <a:schemeClr val="accent1"/>
-            </a:fillRef>
-            <a:effectRef idx="2">
-              <a:schemeClr val="accent1"/>
-            </a:effectRef>
-            <a:fontRef idx="minor">
-              <a:schemeClr val="lt1"/>
-            </a:fontRef>
-          </p:style>
-          <p:txBody>
-            <a:bodyPr rtlCol="0" anchor="ctr"/>
-            <a:lstStyle/>
-            <a:p>
-              <a:pPr algn="ctr"/>
-              <a:endParaRPr lang="en-US"/>
-            </a:p>
-          </p:txBody>
-        </p:sp>
-      </p:grpSp>
-      <p:grpSp>
-        <p:nvGrpSpPr>
-          <p:cNvPr id="39" name="Group 38"/>
-          <p:cNvGrpSpPr/>
-          <p:nvPr/>
-        </p:nvGrpSpPr>
-        <p:grpSpPr>
-          <a:xfrm>
-            <a:off x="4284804" y="6277886"/>
-            <a:ext cx="556586" cy="556582"/>
-            <a:chOff x="3766570" y="4775206"/>
-            <a:chExt cx="454909" cy="454909"/>
-          </a:xfrm>
-        </p:grpSpPr>
-        <p:sp>
-          <p:nvSpPr>
-            <p:cNvPr id="40" name="Rounded Rectangle 39"/>
-            <p:cNvSpPr/>
-            <p:nvPr/>
-          </p:nvSpPr>
-          <p:spPr>
-            <a:xfrm>
-              <a:off x="3766570" y="4775206"/>
-              <a:ext cx="454909" cy="454909"/>
-            </a:xfrm>
-            <a:prstGeom prst="roundRect">
-              <a:avLst/>
-            </a:prstGeom>
-            <a:ln>
-              <a:solidFill>
-                <a:schemeClr val="tx1"/>
-              </a:solidFill>
-            </a:ln>
-          </p:spPr>
-          <p:style>
-            <a:lnRef idx="2">
-              <a:schemeClr val="accent1"/>
-            </a:lnRef>
-            <a:fillRef idx="1">
-              <a:schemeClr val="lt1"/>
-            </a:fillRef>
-            <a:effectRef idx="0">
-              <a:schemeClr val="accent1"/>
-            </a:effectRef>
-            <a:fontRef idx="minor">
-              <a:schemeClr val="dk1"/>
-            </a:fontRef>
-          </p:style>
-          <p:txBody>
-            <a:bodyPr rtlCol="0" anchor="ctr"/>
-            <a:lstStyle/>
-            <a:p>
-              <a:pPr algn="ctr"/>
-              <a:endParaRPr lang="en-US"/>
-            </a:p>
-          </p:txBody>
-        </p:sp>
-        <p:sp>
-          <p:nvSpPr>
-            <p:cNvPr id="41" name="Right Arrow 40"/>
-            <p:cNvSpPr/>
-            <p:nvPr/>
-          </p:nvSpPr>
-          <p:spPr>
-            <a:xfrm>
-              <a:off x="3846415" y="4952340"/>
-              <a:ext cx="146437" cy="111043"/>
-            </a:xfrm>
-            <a:prstGeom prst="rightArrow">
-              <a:avLst/>
-            </a:prstGeom>
-            <a:solidFill>
-              <a:srgbClr val="F5BF64"/>
-            </a:solidFill>
-            <a:ln>
-              <a:solidFill>
-                <a:schemeClr val="tx1"/>
-              </a:solidFill>
-            </a:ln>
-            <a:effectLst/>
-          </p:spPr>
-          <p:style>
-            <a:lnRef idx="1">
-              <a:schemeClr val="accent1"/>
-            </a:lnRef>
-            <a:fillRef idx="3">
-              <a:schemeClr val="accent1"/>
-            </a:fillRef>
-            <a:effectRef idx="2">
-              <a:schemeClr val="accent1"/>
-            </a:effectRef>
-            <a:fontRef idx="minor">
-              <a:schemeClr val="lt1"/>
-            </a:fontRef>
-          </p:style>
-          <p:txBody>
-            <a:bodyPr rtlCol="0" anchor="ctr"/>
-            <a:lstStyle/>
-            <a:p>
-              <a:pPr algn="ctr"/>
-              <a:endParaRPr lang="en-US"/>
-            </a:p>
-          </p:txBody>
-        </p:sp>
-        <p:sp>
-          <p:nvSpPr>
-            <p:cNvPr id="42" name="Right Arrow 41"/>
-            <p:cNvSpPr/>
-            <p:nvPr/>
-          </p:nvSpPr>
-          <p:spPr>
-            <a:xfrm>
-              <a:off x="4011639" y="4952340"/>
-              <a:ext cx="146437" cy="111043"/>
-            </a:xfrm>
-            <a:prstGeom prst="rightArrow">
-              <a:avLst/>
-            </a:prstGeom>
-            <a:solidFill>
-              <a:srgbClr val="F5BF64"/>
-            </a:solidFill>
-            <a:ln>
-              <a:solidFill>
-                <a:schemeClr val="tx1"/>
-              </a:solidFill>
-            </a:ln>
-            <a:effectLst/>
-          </p:spPr>
-          <p:style>
-            <a:lnRef idx="1">
-              <a:schemeClr val="accent1"/>
-            </a:lnRef>
-            <a:fillRef idx="3">
-              <a:schemeClr val="accent1"/>
-            </a:fillRef>
-            <a:effectRef idx="2">
-              <a:schemeClr val="accent1"/>
-            </a:effectRef>
-            <a:fontRef idx="minor">
-              <a:schemeClr val="lt1"/>
-            </a:fontRef>
-          </p:style>
-          <p:txBody>
-            <a:bodyPr rtlCol="0" anchor="ctr"/>
-            <a:lstStyle/>
-            <a:p>
-              <a:pPr algn="ctr"/>
-              <a:endParaRPr lang="en-US"/>
-            </a:p>
-          </p:txBody>
-        </p:sp>
-        <p:sp>
-          <p:nvSpPr>
-            <p:cNvPr id="43" name="Rectangle 42"/>
-            <p:cNvSpPr/>
-            <p:nvPr/>
-          </p:nvSpPr>
-          <p:spPr>
-            <a:xfrm rot="5400000">
-              <a:off x="3919633" y="4857785"/>
-              <a:ext cx="146437" cy="55830"/>
-            </a:xfrm>
-            <a:prstGeom prst="rect">
-              <a:avLst/>
-            </a:prstGeom>
-            <a:solidFill>
-              <a:srgbClr val="CCFFCC"/>
-            </a:solidFill>
-            <a:ln>
-              <a:solidFill>
-                <a:schemeClr val="tx1"/>
-              </a:solidFill>
-            </a:ln>
-            <a:effectLst/>
-          </p:spPr>
-          <p:style>
-            <a:lnRef idx="1">
-              <a:schemeClr val="accent1"/>
-            </a:lnRef>
-            <a:fillRef idx="3">
-              <a:schemeClr val="accent1"/>
-            </a:fillRef>
-            <a:effectRef idx="2">
-              <a:schemeClr val="accent1"/>
-            </a:effectRef>
-            <a:fontRef idx="minor">
-              <a:schemeClr val="lt1"/>
-            </a:fontRef>
-          </p:style>
-          <p:txBody>
-            <a:bodyPr rtlCol="0" anchor="ctr"/>
-            <a:lstStyle/>
-            <a:p>
-              <a:pPr algn="ctr"/>
-              <a:endParaRPr lang="en-US"/>
-            </a:p>
-          </p:txBody>
-        </p:sp>
-        <p:sp>
-          <p:nvSpPr>
-            <p:cNvPr id="44" name="Rectangle 43"/>
-            <p:cNvSpPr/>
-            <p:nvPr/>
-          </p:nvSpPr>
-          <p:spPr>
-            <a:xfrm rot="5400000">
-              <a:off x="3919633" y="5101791"/>
-              <a:ext cx="146437" cy="55830"/>
-            </a:xfrm>
-            <a:prstGeom prst="rect">
-              <a:avLst/>
-            </a:prstGeom>
-            <a:solidFill>
-              <a:srgbClr val="CCFFCC"/>
-            </a:solidFill>
-            <a:ln>
-              <a:solidFill>
-                <a:schemeClr val="tx1"/>
-              </a:solidFill>
-            </a:ln>
-            <a:effectLst/>
-          </p:spPr>
-          <p:style>
-            <a:lnRef idx="1">
-              <a:schemeClr val="accent1"/>
-            </a:lnRef>
-            <a:fillRef idx="3">
-              <a:schemeClr val="accent1"/>
-            </a:fillRef>
-            <a:effectRef idx="2">
-              <a:schemeClr val="accent1"/>
-            </a:effectRef>
-            <a:fontRef idx="minor">
-              <a:schemeClr val="lt1"/>
-            </a:fontRef>
-          </p:style>
-          <p:txBody>
-            <a:bodyPr rtlCol="0" anchor="ctr"/>
-            <a:lstStyle/>
-            <a:p>
-              <a:pPr algn="ctr"/>
-              <a:endParaRPr lang="en-US"/>
-            </a:p>
-          </p:txBody>
-        </p:sp>
-      </p:grpSp>
-      <p:grpSp>
-        <p:nvGrpSpPr>
-          <p:cNvPr id="45" name="Group 44"/>
-          <p:cNvGrpSpPr/>
-          <p:nvPr/>
-        </p:nvGrpSpPr>
-        <p:grpSpPr>
-          <a:xfrm>
-            <a:off x="6627932" y="6277886"/>
-            <a:ext cx="556704" cy="564850"/>
-            <a:chOff x="5628294" y="3578843"/>
-            <a:chExt cx="1617056" cy="1640718"/>
-          </a:xfrm>
-        </p:grpSpPr>
-        <p:sp>
-          <p:nvSpPr>
-            <p:cNvPr id="46" name="Rounded Rectangle 45"/>
-            <p:cNvSpPr/>
-            <p:nvPr/>
-          </p:nvSpPr>
-          <p:spPr>
-            <a:xfrm>
-              <a:off x="5628294" y="3578843"/>
-              <a:ext cx="1617056" cy="1640718"/>
-            </a:xfrm>
-            <a:prstGeom prst="roundRect">
-              <a:avLst/>
-            </a:prstGeom>
-            <a:ln>
-              <a:solidFill>
-                <a:schemeClr val="tx1"/>
-              </a:solidFill>
-            </a:ln>
-          </p:spPr>
-          <p:style>
-            <a:lnRef idx="2">
-              <a:schemeClr val="accent1"/>
-            </a:lnRef>
-            <a:fillRef idx="1">
-              <a:schemeClr val="lt1"/>
-            </a:fillRef>
-            <a:effectRef idx="0">
-              <a:schemeClr val="accent1"/>
-            </a:effectRef>
-            <a:fontRef idx="minor">
-              <a:schemeClr val="dk1"/>
-            </a:fontRef>
-          </p:style>
-          <p:txBody>
-            <a:bodyPr rtlCol="0" anchor="ctr"/>
-            <a:lstStyle/>
-            <a:p>
-              <a:pPr algn="ctr"/>
-              <a:endParaRPr lang="en-US"/>
-            </a:p>
-          </p:txBody>
-        </p:sp>
-        <p:sp>
-          <p:nvSpPr>
-            <p:cNvPr id="47" name="Right Arrow 46"/>
-            <p:cNvSpPr/>
-            <p:nvPr/>
-          </p:nvSpPr>
-          <p:spPr>
-            <a:xfrm>
-              <a:off x="5912117" y="4208498"/>
-              <a:ext cx="520537" cy="394722"/>
-            </a:xfrm>
-            <a:prstGeom prst="rightArrow">
-              <a:avLst/>
-            </a:prstGeom>
-            <a:solidFill>
-              <a:srgbClr val="F5BF64"/>
-            </a:solidFill>
-            <a:ln>
-              <a:solidFill>
-                <a:schemeClr val="tx1"/>
-              </a:solidFill>
-            </a:ln>
-            <a:effectLst/>
-          </p:spPr>
-          <p:style>
-            <a:lnRef idx="1">
-              <a:schemeClr val="accent1"/>
-            </a:lnRef>
-            <a:fillRef idx="3">
-              <a:schemeClr val="accent1"/>
-            </a:fillRef>
-            <a:effectRef idx="2">
-              <a:schemeClr val="accent1"/>
-            </a:effectRef>
-            <a:fontRef idx="minor">
-              <a:schemeClr val="lt1"/>
-            </a:fontRef>
-          </p:style>
-          <p:txBody>
-            <a:bodyPr rtlCol="0" anchor="ctr"/>
-            <a:lstStyle/>
-            <a:p>
-              <a:pPr algn="ctr"/>
-              <a:endParaRPr lang="en-US"/>
-            </a:p>
-          </p:txBody>
-        </p:sp>
-        <p:sp>
-          <p:nvSpPr>
-            <p:cNvPr id="48" name="Right Arrow 47"/>
-            <p:cNvSpPr/>
-            <p:nvPr/>
-          </p:nvSpPr>
-          <p:spPr>
-            <a:xfrm rot="16200000">
-              <a:off x="6185355" y="3775019"/>
-              <a:ext cx="520537" cy="394722"/>
-            </a:xfrm>
-            <a:prstGeom prst="rightArrow">
-              <a:avLst/>
-            </a:prstGeom>
-            <a:solidFill>
-              <a:srgbClr val="578FD3"/>
-            </a:solidFill>
-            <a:ln>
-              <a:solidFill>
-                <a:schemeClr val="tx1"/>
-              </a:solidFill>
-            </a:ln>
-            <a:effectLst/>
-          </p:spPr>
-          <p:style>
-            <a:lnRef idx="1">
-              <a:schemeClr val="accent1"/>
-            </a:lnRef>
-            <a:fillRef idx="3">
-              <a:schemeClr val="accent1"/>
-            </a:fillRef>
-            <a:effectRef idx="2">
-              <a:schemeClr val="accent1"/>
-            </a:effectRef>
-            <a:fontRef idx="minor">
-              <a:schemeClr val="lt1"/>
-            </a:fontRef>
-          </p:style>
-          <p:txBody>
-            <a:bodyPr rtlCol="0" anchor="ctr"/>
-            <a:lstStyle/>
-            <a:p>
-              <a:pPr algn="ctr"/>
-              <a:endParaRPr lang="en-US"/>
-            </a:p>
-          </p:txBody>
-        </p:sp>
-        <p:sp>
-          <p:nvSpPr>
-            <p:cNvPr id="49" name="Rectangle 48"/>
-            <p:cNvSpPr/>
-            <p:nvPr/>
-          </p:nvSpPr>
-          <p:spPr>
-            <a:xfrm>
-              <a:off x="6584618" y="4301776"/>
-              <a:ext cx="403558" cy="198458"/>
-            </a:xfrm>
-            <a:prstGeom prst="rect">
-              <a:avLst/>
-            </a:prstGeom>
-            <a:solidFill>
-              <a:srgbClr val="F5BF64"/>
-            </a:solidFill>
-            <a:ln>
-              <a:solidFill>
-                <a:schemeClr val="tx1"/>
-              </a:solidFill>
-            </a:ln>
-            <a:effectLst/>
-          </p:spPr>
-          <p:style>
-            <a:lnRef idx="1">
-              <a:schemeClr val="accent1"/>
-            </a:lnRef>
-            <a:fillRef idx="3">
-              <a:schemeClr val="accent1"/>
-            </a:fillRef>
-            <a:effectRef idx="2">
-              <a:schemeClr val="accent1"/>
-            </a:effectRef>
-            <a:fontRef idx="minor">
-              <a:schemeClr val="lt1"/>
-            </a:fontRef>
-          </p:style>
-          <p:txBody>
-            <a:bodyPr rtlCol="0" anchor="ctr"/>
-            <a:lstStyle/>
-            <a:p>
-              <a:pPr algn="ctr"/>
-              <a:endParaRPr lang="en-US"/>
-            </a:p>
-          </p:txBody>
-        </p:sp>
-        <p:sp>
-          <p:nvSpPr>
-            <p:cNvPr id="50" name="Rectangle 49"/>
-            <p:cNvSpPr/>
-            <p:nvPr/>
-          </p:nvSpPr>
-          <p:spPr>
-            <a:xfrm rot="5400000">
-              <a:off x="6172384" y="4739748"/>
-              <a:ext cx="520537" cy="198458"/>
-            </a:xfrm>
-            <a:prstGeom prst="rect">
-              <a:avLst/>
-            </a:prstGeom>
-            <a:solidFill>
-              <a:srgbClr val="578FD3"/>
-            </a:solidFill>
-            <a:ln>
-              <a:solidFill>
-                <a:schemeClr val="tx1"/>
-              </a:solidFill>
-            </a:ln>
-            <a:effectLst/>
-          </p:spPr>
-          <p:style>
-            <a:lnRef idx="1">
-              <a:schemeClr val="accent1"/>
-            </a:lnRef>
-            <a:fillRef idx="3">
-              <a:schemeClr val="accent1"/>
-            </a:fillRef>
-            <a:effectRef idx="2">
-              <a:schemeClr val="accent1"/>
-            </a:effectRef>
-            <a:fontRef idx="minor">
-              <a:schemeClr val="lt1"/>
-            </a:fontRef>
-          </p:style>
-          <p:txBody>
-            <a:bodyPr rtlCol="0" anchor="ctr"/>
-            <a:lstStyle/>
-            <a:p>
-              <a:pPr algn="ctr"/>
-              <a:endParaRPr lang="en-US"/>
-            </a:p>
-          </p:txBody>
-        </p:sp>
-      </p:grpSp>
-      <p:sp>
-        <p:nvSpPr>
-          <p:cNvPr id="53" name="TextBox 52"/>
-          <p:cNvSpPr txBox="1"/>
-          <p:nvPr/>
-        </p:nvSpPr>
-        <p:spPr>
-          <a:xfrm>
-            <a:off x="3603452" y="6842736"/>
-            <a:ext cx="582211" cy="246221"/>
-          </a:xfrm>
-          <a:prstGeom prst="rect">
-            <a:avLst/>
-          </a:prstGeom>
-          <a:noFill/>
-        </p:spPr>
-        <p:txBody>
-          <a:bodyPr wrap="none" rtlCol="0">
-            <a:spAutoFit/>
-          </a:bodyPr>
-          <a:lstStyle/>
-          <a:p>
-            <a:pPr algn="ctr"/>
-            <a:r>
-              <a:rPr lang="en-US" sz="1000" dirty="0" smtClean="0"/>
-              <a:t>Regular</a:t>
-            </a:r>
-          </a:p>
-        </p:txBody>
-      </p:sp>
-      <p:sp>
-        <p:nvSpPr>
-          <p:cNvPr id="54" name="TextBox 53"/>
-          <p:cNvSpPr txBox="1"/>
-          <p:nvPr/>
-        </p:nvSpPr>
-        <p:spPr>
-          <a:xfrm>
-            <a:off x="5975453" y="6842736"/>
-            <a:ext cx="518091" cy="246221"/>
-          </a:xfrm>
-          <a:prstGeom prst="rect">
-            <a:avLst/>
-          </a:prstGeom>
-          <a:noFill/>
-        </p:spPr>
-        <p:txBody>
-          <a:bodyPr wrap="none" rtlCol="0">
-            <a:spAutoFit/>
-          </a:bodyPr>
-          <a:lstStyle/>
-          <a:p>
-            <a:pPr algn="ctr"/>
-            <a:r>
-              <a:rPr lang="en-US" sz="1000" dirty="0" smtClean="0"/>
-              <a:t>Elbow</a:t>
-            </a:r>
-            <a:endParaRPr lang="en-US" sz="1000" dirty="0"/>
-          </a:p>
-        </p:txBody>
-      </p:sp>
-      <p:sp>
-        <p:nvSpPr>
-          <p:cNvPr id="55" name="TextBox 54"/>
-          <p:cNvSpPr txBox="1"/>
-          <p:nvPr/>
-        </p:nvSpPr>
-        <p:spPr>
-          <a:xfrm>
-            <a:off x="6568120" y="6842736"/>
-            <a:ext cx="673457" cy="246221"/>
-          </a:xfrm>
-          <a:prstGeom prst="rect">
-            <a:avLst/>
-          </a:prstGeom>
-          <a:noFill/>
-        </p:spPr>
-        <p:txBody>
-          <a:bodyPr wrap="none" rtlCol="0">
-            <a:spAutoFit/>
-          </a:bodyPr>
-          <a:lstStyle/>
-          <a:p>
-            <a:pPr algn="ctr"/>
-            <a:r>
-              <a:rPr lang="en-US" sz="1000" dirty="0" smtClean="0"/>
-              <a:t>Exchange</a:t>
-            </a:r>
-            <a:endParaRPr lang="en-US" sz="1000" dirty="0"/>
-          </a:p>
-        </p:txBody>
-      </p:sp>
-      <p:sp>
-        <p:nvSpPr>
-          <p:cNvPr id="56" name="TextBox 55"/>
-          <p:cNvSpPr txBox="1"/>
-          <p:nvPr/>
-        </p:nvSpPr>
-        <p:spPr>
-          <a:xfrm>
-            <a:off x="4224933" y="6842736"/>
-            <a:ext cx="673457" cy="246221"/>
-          </a:xfrm>
-          <a:prstGeom prst="rect">
-            <a:avLst/>
-          </a:prstGeom>
-          <a:noFill/>
-        </p:spPr>
-        <p:txBody>
-          <a:bodyPr wrap="none" rtlCol="0">
-            <a:spAutoFit/>
-          </a:bodyPr>
-          <a:lstStyle/>
-          <a:p>
-            <a:pPr algn="ctr"/>
-            <a:r>
-              <a:rPr lang="en-US" sz="1000" dirty="0" smtClean="0"/>
-              <a:t>Exchange</a:t>
-            </a:r>
-            <a:endParaRPr lang="en-US" sz="1000" dirty="0"/>
-          </a:p>
-        </p:txBody>
-      </p:sp>
-      <p:sp>
-        <p:nvSpPr>
-          <p:cNvPr id="58" name="Left Bracket 57"/>
-          <p:cNvSpPr/>
-          <p:nvPr/>
-        </p:nvSpPr>
-        <p:spPr>
-          <a:xfrm rot="16200000">
-            <a:off x="4128571" y="9197123"/>
-            <a:ext cx="219754" cy="1632313"/>
-          </a:xfrm>
-          <a:prstGeom prst="leftBracket">
-            <a:avLst/>
-          </a:prstGeom>
-          <a:ln>
-            <a:solidFill>
-              <a:schemeClr val="tx1"/>
-            </a:solidFill>
-          </a:ln>
-          <a:effectLst/>
-        </p:spPr>
-        <p:style>
-          <a:lnRef idx="2">
-            <a:schemeClr val="accent1"/>
-          </a:lnRef>
-          <a:fillRef idx="0">
-            <a:schemeClr val="accent1"/>
-          </a:fillRef>
-          <a:effectRef idx="1">
-            <a:schemeClr val="accent1"/>
-          </a:effectRef>
-          <a:fontRef idx="minor">
-            <a:schemeClr val="tx1"/>
-          </a:fontRef>
-        </p:style>
-        <p:txBody>
-          <a:bodyPr rtlCol="0" anchor="ctr"/>
-          <a:lstStyle/>
-          <a:p>
-            <a:pPr algn="ctr"/>
-            <a:endParaRPr lang="en-US"/>
-          </a:p>
-        </p:txBody>
-      </p:sp>
-      <p:sp>
-        <p:nvSpPr>
-          <p:cNvPr id="59" name="TextBox 58"/>
-          <p:cNvSpPr txBox="1"/>
-          <p:nvPr/>
-        </p:nvSpPr>
-        <p:spPr>
-          <a:xfrm>
-            <a:off x="3551625" y="10123157"/>
-            <a:ext cx="1365074" cy="338554"/>
-          </a:xfrm>
-          <a:prstGeom prst="rect">
-            <a:avLst/>
-          </a:prstGeom>
-          <a:noFill/>
-        </p:spPr>
-        <p:txBody>
-          <a:bodyPr wrap="square" rtlCol="0">
-            <a:spAutoFit/>
-          </a:bodyPr>
-          <a:lstStyle/>
-          <a:p>
-            <a:pPr algn="ctr"/>
-            <a:r>
-              <a:rPr lang="en-US" sz="1600" dirty="0" smtClean="0"/>
-              <a:t>Stay</a:t>
-            </a:r>
-            <a:endParaRPr lang="en-US" sz="1600" dirty="0"/>
-          </a:p>
-        </p:txBody>
-      </p:sp>
-      <p:sp>
-        <p:nvSpPr>
-          <p:cNvPr id="60" name="Left Bracket 59"/>
-          <p:cNvSpPr/>
-          <p:nvPr/>
-        </p:nvSpPr>
-        <p:spPr>
-          <a:xfrm rot="16200000">
-            <a:off x="6464807" y="9197122"/>
-            <a:ext cx="219754" cy="1632313"/>
-          </a:xfrm>
-          <a:prstGeom prst="leftBracket">
-            <a:avLst/>
-          </a:prstGeom>
-          <a:ln>
-            <a:solidFill>
-              <a:schemeClr val="tx1"/>
-            </a:solidFill>
-          </a:ln>
-          <a:effectLst/>
-        </p:spPr>
-        <p:style>
-          <a:lnRef idx="2">
-            <a:schemeClr val="accent1"/>
-          </a:lnRef>
-          <a:fillRef idx="0">
-            <a:schemeClr val="accent1"/>
-          </a:fillRef>
-          <a:effectRef idx="1">
-            <a:schemeClr val="accent1"/>
-          </a:effectRef>
-          <a:fontRef idx="minor">
-            <a:schemeClr val="tx1"/>
-          </a:fontRef>
-        </p:style>
-        <p:txBody>
-          <a:bodyPr rtlCol="0" anchor="ctr"/>
-          <a:lstStyle/>
-          <a:p>
-            <a:pPr algn="ctr"/>
-            <a:endParaRPr lang="en-US"/>
-          </a:p>
-        </p:txBody>
-      </p:sp>
-      <p:sp>
-        <p:nvSpPr>
-          <p:cNvPr id="61" name="TextBox 60"/>
-          <p:cNvSpPr txBox="1"/>
-          <p:nvPr/>
-        </p:nvSpPr>
-        <p:spPr>
-          <a:xfrm>
-            <a:off x="5887861" y="10123156"/>
-            <a:ext cx="1365074" cy="338554"/>
-          </a:xfrm>
-          <a:prstGeom prst="rect">
-            <a:avLst/>
-          </a:prstGeom>
-          <a:noFill/>
-        </p:spPr>
-        <p:txBody>
-          <a:bodyPr wrap="square" rtlCol="0">
-            <a:spAutoFit/>
-          </a:bodyPr>
-          <a:lstStyle/>
-          <a:p>
-            <a:pPr algn="ctr"/>
-            <a:r>
-              <a:rPr lang="en-US" sz="1600" dirty="0" smtClean="0"/>
-              <a:t>Switch</a:t>
-            </a:r>
-            <a:endParaRPr lang="en-US" sz="1600" dirty="0"/>
-          </a:p>
-        </p:txBody>
-      </p:sp>
-      <p:sp>
-        <p:nvSpPr>
-          <p:cNvPr id="62" name="Left Bracket 61"/>
-          <p:cNvSpPr/>
-          <p:nvPr/>
-        </p:nvSpPr>
-        <p:spPr>
-          <a:xfrm rot="16200000">
-            <a:off x="5635403" y="8959622"/>
-            <a:ext cx="219754" cy="3291129"/>
-          </a:xfrm>
-          <a:prstGeom prst="leftBracket">
-            <a:avLst/>
-          </a:prstGeom>
-          <a:ln>
-            <a:solidFill>
-              <a:schemeClr val="tx1"/>
-            </a:solidFill>
-          </a:ln>
-          <a:effectLst/>
-        </p:spPr>
-        <p:style>
-          <a:lnRef idx="2">
-            <a:schemeClr val="accent1"/>
-          </a:lnRef>
-          <a:fillRef idx="0">
-            <a:schemeClr val="accent1"/>
-          </a:fillRef>
-          <a:effectRef idx="1">
-            <a:schemeClr val="accent1"/>
-          </a:effectRef>
-          <a:fontRef idx="minor">
-            <a:schemeClr val="tx1"/>
-          </a:fontRef>
-        </p:style>
-        <p:txBody>
-          <a:bodyPr rtlCol="0" anchor="ctr"/>
-          <a:lstStyle/>
-          <a:p>
-            <a:pPr algn="ctr"/>
-            <a:endParaRPr lang="en-US"/>
-          </a:p>
-        </p:txBody>
-      </p:sp>
-      <p:sp>
-        <p:nvSpPr>
-          <p:cNvPr id="63" name="TextBox 62"/>
-          <p:cNvSpPr txBox="1"/>
-          <p:nvPr/>
-        </p:nvSpPr>
-        <p:spPr>
-          <a:xfrm>
-            <a:off x="4099715" y="10715064"/>
-            <a:ext cx="3291130" cy="338554"/>
-          </a:xfrm>
-          <a:prstGeom prst="rect">
-            <a:avLst/>
-          </a:prstGeom>
-          <a:noFill/>
-        </p:spPr>
-        <p:txBody>
-          <a:bodyPr wrap="square" rtlCol="0">
-            <a:spAutoFit/>
-          </a:bodyPr>
-          <a:lstStyle/>
-          <a:p>
-            <a:pPr algn="ctr"/>
-            <a:r>
-              <a:rPr lang="en-US" sz="1600" dirty="0" smtClean="0"/>
-              <a:t>Exchange</a:t>
-            </a:r>
           </a:p>
         </p:txBody>
       </p:sp>

</xml_diff>